<commit_message>
ready for odsc west
</commit_message>
<xml_diff>
--- a/talk/slides.pptx
+++ b/talk/slides.pptx
@@ -8,7 +8,7 @@
     <p:notesMasterId r:id="rId43"/>
   </p:notesMasterIdLst>
   <p:sldIdLst>
-    <p:sldId id="256" r:id="rId2"/>
+    <p:sldId id="311" r:id="rId2"/>
     <p:sldId id="286" r:id="rId3"/>
     <p:sldId id="257" r:id="rId4"/>
     <p:sldId id="258" r:id="rId5"/>
@@ -152,7 +152,7 @@
       <p14:sectionLst xmlns:p14="http://schemas.microsoft.com/office/powerpoint/2010/main">
         <p14:section name="Default Section" id="{1D78B056-B9F0-4A42-AB86-8EA291CEDE46}">
           <p14:sldIdLst>
-            <p14:sldId id="256"/>
+            <p14:sldId id="311"/>
           </p14:sldIdLst>
         </p14:section>
         <p14:section name="Part1" id="{FF43B638-B555-46C0-9746-81DA73D0EEB7}">
@@ -313,7 +313,7 @@
           <a:p>
             <a:fld id="{C3BB7F62-3A72-49E8-AFA1-341972F5788E}" type="datetimeFigureOut">
               <a:rPr lang="en-US" smtClean="0"/>
-              <a:t>4/23/2024</a:t>
+              <a:t>10/29/2024</a:t>
             </a:fld>
             <a:endParaRPr lang="en-US"/>
           </a:p>
@@ -1210,6 +1210,28 @@
           </a:p>
           <a:p>
             <a:endParaRPr lang="en-US" dirty="0"/>
+          </a:p>
+          <a:p>
+            <a:r>
+              <a:rPr lang="en-US" dirty="0"/>
+              <a:t>docker run --name </a:t>
+            </a:r>
+            <a:r>
+              <a:rPr lang="en-US" dirty="0" err="1"/>
+              <a:t>jupyter</a:t>
+            </a:r>
+            <a:r>
+              <a:rPr lang="en-US" dirty="0"/>
+              <a:t> -p 8888:8888 quay.io/</a:t>
+            </a:r>
+            <a:r>
+              <a:rPr lang="en-US" dirty="0" err="1"/>
+              <a:t>jupyter</a:t>
+            </a:r>
+            <a:r>
+              <a:rPr lang="en-US" dirty="0"/>
+              <a:t>/minimal-notebook:lab-4.1.6 -d </a:t>
+            </a:r>
           </a:p>
         </p:txBody>
       </p:sp>
@@ -3347,7 +3369,7 @@
           <a:p>
             <a:fld id="{241EB5C9-1307-BA42-ABA2-0BC069CD8E7F}" type="datetimeFigureOut">
               <a:rPr lang="en-US" smtClean="0"/>
-              <a:t>4/23/2024</a:t>
+              <a:t>10/29/2024</a:t>
             </a:fld>
             <a:endParaRPr lang="en-US"/>
           </a:p>
@@ -9111,13 +9133,13 @@
         </p:nvSpPr>
         <p:spPr>
           <a:xfrm>
-            <a:off x="4303776" y="507207"/>
-            <a:ext cx="4686634" cy="4323160"/>
+            <a:off x="4303776" y="507206"/>
+            <a:ext cx="4686634" cy="4448457"/>
           </a:xfrm>
         </p:spPr>
         <p:txBody>
           <a:bodyPr>
-            <a:normAutofit/>
+            <a:normAutofit fontScale="92500" lnSpcReduction="10000"/>
           </a:bodyPr>
           <a:lstStyle/>
           <a:p>
@@ -9126,7 +9148,15 @@
             </a:pPr>
             <a:r>
               <a:rPr sz="3200" dirty="0"/>
-              <a:t>Open Data Science Conference East 2024</a:t>
+              <a:t>Open Data Science Conference </a:t>
+            </a:r>
+            <a:r>
+              <a:rPr lang="en-US" sz="3200" dirty="0"/>
+              <a:t>West</a:t>
+            </a:r>
+            <a:r>
+              <a:rPr sz="3200" dirty="0"/>
+              <a:t> 2024</a:t>
             </a:r>
           </a:p>
           <a:p>
@@ -9205,9 +9235,36 @@
               <a:t> </a:t>
             </a:r>
           </a:p>
+          <a:p>
+            <a:pPr marL="0" lvl="0" indent="0">
+              <a:buNone/>
+            </a:pPr>
+            <a:r>
+              <a:rPr lang="en-US" dirty="0" err="1"/>
+              <a:t>Apphammer</a:t>
+            </a:r>
+            <a:endParaRPr lang="en-US" dirty="0"/>
+          </a:p>
+          <a:p>
+            <a:pPr marL="0" lvl="0" indent="0">
+              <a:buNone/>
+            </a:pPr>
+            <a:r>
+              <a:rPr lang="en-US" dirty="0">
+                <a:hlinkClick r:id="rId5"/>
+              </a:rPr>
+              <a:t>https://apphammer.co</a:t>
+            </a:r>
+            <a:endParaRPr lang="en-US" dirty="0"/>
+          </a:p>
         </p:txBody>
       </p:sp>
     </p:spTree>
+    <p:extLst>
+      <p:ext uri="{BB962C8B-B14F-4D97-AF65-F5344CB8AC3E}">
+        <p14:creationId xmlns:p14="http://schemas.microsoft.com/office/powerpoint/2010/main" val="1931690552"/>
+      </p:ext>
+    </p:extLst>
   </p:cSld>
   <p:clrMapOvr>
     <a:masterClrMapping/>
@@ -19235,8 +19292,8 @@
               <a:t>Container </a:t>
             </a:r>
             <a:r>
-              <a:rPr lang="en-US" dirty="0" err="1"/>
-              <a:t>Terminolog</a:t>
+              <a:rPr lang="en-US" dirty="0"/>
+              <a:t>Terminology</a:t>
             </a:r>
             <a:endParaRPr dirty="0"/>
           </a:p>

</xml_diff>

<commit_message>
updated slides for talk
</commit_message>
<xml_diff>
--- a/talk/slides.pptx
+++ b/talk/slides.pptx
@@ -5,50 +5,51 @@
     <p:sldMasterId id="2147483684" r:id="rId1"/>
   </p:sldMasterIdLst>
   <p:notesMasterIdLst>
-    <p:notesMasterId r:id="rId43"/>
+    <p:notesMasterId r:id="rId44"/>
   </p:notesMasterIdLst>
   <p:sldIdLst>
-    <p:sldId id="311" r:id="rId2"/>
-    <p:sldId id="286" r:id="rId3"/>
-    <p:sldId id="257" r:id="rId4"/>
-    <p:sldId id="258" r:id="rId5"/>
-    <p:sldId id="259" r:id="rId6"/>
-    <p:sldId id="260" r:id="rId7"/>
-    <p:sldId id="261" r:id="rId8"/>
-    <p:sldId id="262" r:id="rId9"/>
-    <p:sldId id="263" r:id="rId10"/>
-    <p:sldId id="287" r:id="rId11"/>
-    <p:sldId id="288" r:id="rId12"/>
-    <p:sldId id="266" r:id="rId13"/>
-    <p:sldId id="290" r:id="rId14"/>
-    <p:sldId id="291" r:id="rId15"/>
-    <p:sldId id="268" r:id="rId16"/>
-    <p:sldId id="293" r:id="rId17"/>
-    <p:sldId id="294" r:id="rId18"/>
-    <p:sldId id="269" r:id="rId19"/>
-    <p:sldId id="295" r:id="rId20"/>
-    <p:sldId id="296" r:id="rId21"/>
-    <p:sldId id="272" r:id="rId22"/>
-    <p:sldId id="300" r:id="rId23"/>
-    <p:sldId id="298" r:id="rId24"/>
-    <p:sldId id="299" r:id="rId25"/>
-    <p:sldId id="301" r:id="rId26"/>
-    <p:sldId id="273" r:id="rId27"/>
-    <p:sldId id="274" r:id="rId28"/>
-    <p:sldId id="303" r:id="rId29"/>
-    <p:sldId id="305" r:id="rId30"/>
-    <p:sldId id="276" r:id="rId31"/>
-    <p:sldId id="304" r:id="rId32"/>
-    <p:sldId id="306" r:id="rId33"/>
-    <p:sldId id="307" r:id="rId34"/>
-    <p:sldId id="278" r:id="rId35"/>
-    <p:sldId id="279" r:id="rId36"/>
-    <p:sldId id="309" r:id="rId37"/>
-    <p:sldId id="308" r:id="rId38"/>
-    <p:sldId id="282" r:id="rId39"/>
-    <p:sldId id="283" r:id="rId40"/>
-    <p:sldId id="284" r:id="rId41"/>
-    <p:sldId id="310" r:id="rId42"/>
+    <p:sldId id="312" r:id="rId2"/>
+    <p:sldId id="311" r:id="rId3"/>
+    <p:sldId id="286" r:id="rId4"/>
+    <p:sldId id="257" r:id="rId5"/>
+    <p:sldId id="258" r:id="rId6"/>
+    <p:sldId id="259" r:id="rId7"/>
+    <p:sldId id="260" r:id="rId8"/>
+    <p:sldId id="261" r:id="rId9"/>
+    <p:sldId id="262" r:id="rId10"/>
+    <p:sldId id="263" r:id="rId11"/>
+    <p:sldId id="287" r:id="rId12"/>
+    <p:sldId id="288" r:id="rId13"/>
+    <p:sldId id="266" r:id="rId14"/>
+    <p:sldId id="290" r:id="rId15"/>
+    <p:sldId id="291" r:id="rId16"/>
+    <p:sldId id="268" r:id="rId17"/>
+    <p:sldId id="293" r:id="rId18"/>
+    <p:sldId id="294" r:id="rId19"/>
+    <p:sldId id="269" r:id="rId20"/>
+    <p:sldId id="295" r:id="rId21"/>
+    <p:sldId id="296" r:id="rId22"/>
+    <p:sldId id="272" r:id="rId23"/>
+    <p:sldId id="300" r:id="rId24"/>
+    <p:sldId id="298" r:id="rId25"/>
+    <p:sldId id="299" r:id="rId26"/>
+    <p:sldId id="301" r:id="rId27"/>
+    <p:sldId id="273" r:id="rId28"/>
+    <p:sldId id="274" r:id="rId29"/>
+    <p:sldId id="303" r:id="rId30"/>
+    <p:sldId id="305" r:id="rId31"/>
+    <p:sldId id="276" r:id="rId32"/>
+    <p:sldId id="304" r:id="rId33"/>
+    <p:sldId id="306" r:id="rId34"/>
+    <p:sldId id="307" r:id="rId35"/>
+    <p:sldId id="278" r:id="rId36"/>
+    <p:sldId id="279" r:id="rId37"/>
+    <p:sldId id="309" r:id="rId38"/>
+    <p:sldId id="308" r:id="rId39"/>
+    <p:sldId id="282" r:id="rId40"/>
+    <p:sldId id="283" r:id="rId41"/>
+    <p:sldId id="284" r:id="rId42"/>
+    <p:sldId id="310" r:id="rId43"/>
   </p:sldIdLst>
   <p:sldSz cx="9144000" cy="5143500" type="screen16x9"/>
   <p:notesSz cx="6858000" cy="9144000"/>
@@ -152,6 +153,7 @@
       <p14:sectionLst xmlns:p14="http://schemas.microsoft.com/office/powerpoint/2010/main">
         <p14:section name="Default Section" id="{1D78B056-B9F0-4A42-AB86-8EA291CEDE46}">
           <p14:sldIdLst>
+            <p14:sldId id="312"/>
             <p14:sldId id="311"/>
           </p14:sldIdLst>
         </p14:section>
@@ -654,7 +656,7 @@
           <a:p>
             <a:fld id="{B4EE5488-E3B2-42AD-BB20-4BF3CAA862D2}" type="slidenum">
               <a:rPr lang="en-US" smtClean="0"/>
-              <a:t>8</a:t>
+              <a:t>9</a:t>
             </a:fld>
             <a:endParaRPr lang="en-US"/>
           </a:p>
@@ -738,7 +740,7 @@
           <a:p>
             <a:fld id="{B4EE5488-E3B2-42AD-BB20-4BF3CAA862D2}" type="slidenum">
               <a:rPr lang="en-US" smtClean="0"/>
-              <a:t>29</a:t>
+              <a:t>30</a:t>
             </a:fld>
             <a:endParaRPr lang="en-US"/>
           </a:p>
@@ -822,7 +824,7 @@
           <a:p>
             <a:fld id="{B4EE5488-E3B2-42AD-BB20-4BF3CAA862D2}" type="slidenum">
               <a:rPr lang="en-US" smtClean="0"/>
-              <a:t>31</a:t>
+              <a:t>32</a:t>
             </a:fld>
             <a:endParaRPr lang="en-US"/>
           </a:p>
@@ -906,7 +908,7 @@
           <a:p>
             <a:fld id="{B4EE5488-E3B2-42AD-BB20-4BF3CAA862D2}" type="slidenum">
               <a:rPr lang="en-US" smtClean="0"/>
-              <a:t>32</a:t>
+              <a:t>33</a:t>
             </a:fld>
             <a:endParaRPr lang="en-US"/>
           </a:p>
@@ -990,7 +992,7 @@
           <a:p>
             <a:fld id="{B4EE5488-E3B2-42AD-BB20-4BF3CAA862D2}" type="slidenum">
               <a:rPr lang="en-US" smtClean="0"/>
-              <a:t>36</a:t>
+              <a:t>37</a:t>
             </a:fld>
             <a:endParaRPr lang="en-US"/>
           </a:p>
@@ -1110,7 +1112,7 @@
           <a:p>
             <a:fld id="{B4EE5488-E3B2-42AD-BB20-4BF3CAA862D2}" type="slidenum">
               <a:rPr lang="en-US" smtClean="0"/>
-              <a:t>14</a:t>
+              <a:t>15</a:t>
             </a:fld>
             <a:endParaRPr lang="en-US"/>
           </a:p>
@@ -1252,7 +1254,7 @@
           <a:p>
             <a:fld id="{B4EE5488-E3B2-42AD-BB20-4BF3CAA862D2}" type="slidenum">
               <a:rPr lang="en-US" smtClean="0"/>
-              <a:t>17</a:t>
+              <a:t>18</a:t>
             </a:fld>
             <a:endParaRPr lang="en-US"/>
           </a:p>
@@ -1336,7 +1338,7 @@
           <a:p>
             <a:fld id="{B4EE5488-E3B2-42AD-BB20-4BF3CAA862D2}" type="slidenum">
               <a:rPr lang="en-US" smtClean="0"/>
-              <a:t>19</a:t>
+              <a:t>20</a:t>
             </a:fld>
             <a:endParaRPr lang="en-US"/>
           </a:p>
@@ -1420,7 +1422,7 @@
           <a:p>
             <a:fld id="{B4EE5488-E3B2-42AD-BB20-4BF3CAA862D2}" type="slidenum">
               <a:rPr lang="en-US" smtClean="0"/>
-              <a:t>20</a:t>
+              <a:t>21</a:t>
             </a:fld>
             <a:endParaRPr lang="en-US"/>
           </a:p>
@@ -1504,7 +1506,7 @@
           <a:p>
             <a:fld id="{B4EE5488-E3B2-42AD-BB20-4BF3CAA862D2}" type="slidenum">
               <a:rPr lang="en-US" smtClean="0"/>
-              <a:t>22</a:t>
+              <a:t>23</a:t>
             </a:fld>
             <a:endParaRPr lang="en-US"/>
           </a:p>
@@ -1588,7 +1590,7 @@
           <a:p>
             <a:fld id="{B4EE5488-E3B2-42AD-BB20-4BF3CAA862D2}" type="slidenum">
               <a:rPr lang="en-US" smtClean="0"/>
-              <a:t>23</a:t>
+              <a:t>24</a:t>
             </a:fld>
             <a:endParaRPr lang="en-US"/>
           </a:p>
@@ -1672,7 +1674,7 @@
           <a:p>
             <a:fld id="{B4EE5488-E3B2-42AD-BB20-4BF3CAA862D2}" type="slidenum">
               <a:rPr lang="en-US" smtClean="0"/>
-              <a:t>24</a:t>
+              <a:t>25</a:t>
             </a:fld>
             <a:endParaRPr lang="en-US"/>
           </a:p>
@@ -1756,7 +1758,7 @@
           <a:p>
             <a:fld id="{B4EE5488-E3B2-42AD-BB20-4BF3CAA862D2}" type="slidenum">
               <a:rPr lang="en-US" smtClean="0"/>
-              <a:t>28</a:t>
+              <a:t>29</a:t>
             </a:fld>
             <a:endParaRPr lang="en-US"/>
           </a:p>
@@ -9083,186 +9085,40 @@
           <a:chExt cx="0" cy="0"/>
         </a:xfrm>
       </p:grpSpPr>
-      <p:sp>
-        <p:nvSpPr>
-          <p:cNvPr id="2" name="Title 1"/>
-          <p:cNvSpPr>
-            <a:spLocks noGrp="1"/>
-          </p:cNvSpPr>
-          <p:nvPr>
-            <p:ph type="title"/>
-          </p:nvPr>
-        </p:nvSpPr>
-        <p:spPr/>
-        <p:txBody>
-          <a:bodyPr>
-            <a:normAutofit/>
-          </a:bodyPr>
-          <a:lstStyle/>
-          <a:p>
-            <a:pPr marL="0" lvl="0" indent="0">
-              <a:buNone/>
-            </a:pPr>
-            <a:r>
-              <a:rPr dirty="0"/>
-              <a:t>Introduction to Containers for Data Science </a:t>
-            </a:r>
-            <a:br>
-              <a:rPr lang="en-US" dirty="0"/>
-            </a:br>
-            <a:r>
-              <a:rPr lang="en-US" dirty="0"/>
-              <a:t>and</a:t>
-            </a:r>
-            <a:r>
-              <a:rPr dirty="0"/>
-              <a:t> Data Engineering</a:t>
-            </a:r>
-          </a:p>
-        </p:txBody>
-      </p:sp>
-      <p:sp>
-        <p:nvSpPr>
-          <p:cNvPr id="3" name="Content Placeholder 2"/>
-          <p:cNvSpPr>
-            <a:spLocks noGrp="1"/>
-          </p:cNvSpPr>
-          <p:nvPr>
-            <p:ph sz="quarter" idx="13"/>
-          </p:nvPr>
-        </p:nvSpPr>
+      <p:pic>
+        <p:nvPicPr>
+          <p:cNvPr id="7" name="Picture 6" descr="A screenshot of a computer&#10;&#10;Description automatically generated">
+            <a:extLst>
+              <a:ext uri="{FF2B5EF4-FFF2-40B4-BE49-F238E27FC236}">
+                <a16:creationId xmlns:a16="http://schemas.microsoft.com/office/drawing/2014/main" id="{318BFBCD-DFD2-9FAD-4C26-B9C4E0ED5B4D}"/>
+              </a:ext>
+            </a:extLst>
+          </p:cNvPr>
+          <p:cNvPicPr>
+            <a:picLocks noChangeAspect="1"/>
+          </p:cNvPicPr>
+          <p:nvPr/>
+        </p:nvPicPr>
+        <p:blipFill>
+          <a:blip r:embed="rId2"/>
+          <a:stretch>
+            <a:fillRect/>
+          </a:stretch>
+        </p:blipFill>
         <p:spPr>
           <a:xfrm>
-            <a:off x="4303776" y="507206"/>
-            <a:ext cx="4686634" cy="4448457"/>
+            <a:off x="0" y="0"/>
+            <a:ext cx="9144000" cy="5143500"/>
           </a:xfrm>
+          <a:prstGeom prst="rect">
+            <a:avLst/>
+          </a:prstGeom>
         </p:spPr>
-        <p:txBody>
-          <a:bodyPr>
-            <a:normAutofit fontScale="92500" lnSpcReduction="10000"/>
-          </a:bodyPr>
-          <a:lstStyle/>
-          <a:p>
-            <a:pPr marL="0" lvl="0" indent="0">
-              <a:buNone/>
-            </a:pPr>
-            <a:r>
-              <a:rPr sz="3200" dirty="0"/>
-              <a:t>Open Data Science Conference </a:t>
-            </a:r>
-            <a:r>
-              <a:rPr lang="en-US" sz="3200" dirty="0"/>
-              <a:t>West</a:t>
-            </a:r>
-            <a:r>
-              <a:rPr sz="3200" dirty="0"/>
-              <a:t> 2024</a:t>
-            </a:r>
-          </a:p>
-          <a:p>
-            <a:pPr marL="0" indent="0">
-              <a:buNone/>
-            </a:pPr>
-            <a:r>
-              <a:rPr lang="en-US" dirty="0">
-                <a:hlinkClick r:id="rId2"/>
-              </a:rPr>
-              <a:t>https://github.com/mafudge/odsc24</a:t>
-            </a:r>
-            <a:r>
-              <a:rPr lang="en-US" dirty="0"/>
-              <a:t> </a:t>
-            </a:r>
-          </a:p>
-          <a:p>
-            <a:pPr marL="0" indent="0">
-              <a:buNone/>
-            </a:pPr>
-            <a:br>
-              <a:rPr lang="en-US" sz="2000" dirty="0"/>
-            </a:br>
-            <a:r>
-              <a:rPr sz="3200" dirty="0"/>
-              <a:t>Michael Fudge</a:t>
-            </a:r>
-            <a:endParaRPr lang="en-US" sz="3200" dirty="0"/>
-          </a:p>
-          <a:p>
-            <a:pPr marL="0" indent="0">
-              <a:buNone/>
-            </a:pPr>
-            <a:r>
-              <a:rPr lang="en-US" dirty="0"/>
-              <a:t>Professor of Practice</a:t>
-            </a:r>
-            <a:br>
-              <a:rPr lang="en-US" dirty="0"/>
-            </a:br>
-            <a:r>
-              <a:rPr lang="en-US" dirty="0">
-                <a:hlinkClick r:id="rId3"/>
-              </a:rPr>
-              <a:t>mafudge@syr.edu</a:t>
-            </a:r>
-            <a:r>
-              <a:rPr lang="en-US" dirty="0"/>
-              <a:t> </a:t>
-            </a:r>
-            <a:br>
-              <a:rPr lang="en-US" dirty="0"/>
-            </a:br>
-            <a:endParaRPr lang="en-US" dirty="0"/>
-          </a:p>
-          <a:p>
-            <a:pPr marL="0" lvl="0" indent="0">
-              <a:buNone/>
-            </a:pPr>
-            <a:r>
-              <a:rPr lang="en-US" dirty="0"/>
-              <a:t>Syracuse University, iSchool</a:t>
-            </a:r>
-            <a:br>
-              <a:rPr lang="en-US" dirty="0"/>
-            </a:br>
-            <a:r>
-              <a:rPr lang="en-US" dirty="0">
-                <a:hlinkClick r:id="rId4"/>
-              </a:rPr>
-              <a:t>https://ischool.syr.edu</a:t>
-            </a:r>
-            <a:r>
-              <a:rPr lang="en-US" dirty="0"/>
-              <a:t> </a:t>
-            </a:r>
-          </a:p>
-          <a:p>
-            <a:pPr marL="0" lvl="0" indent="0">
-              <a:buNone/>
-            </a:pPr>
-            <a:r>
-              <a:rPr lang="en-US" dirty="0" err="1"/>
-              <a:t>Apphammer</a:t>
-            </a:r>
-            <a:endParaRPr lang="en-US" dirty="0"/>
-          </a:p>
-          <a:p>
-            <a:pPr marL="0" lvl="0" indent="0">
-              <a:buNone/>
-            </a:pPr>
-            <a:r>
-              <a:rPr lang="en-US" dirty="0">
-                <a:hlinkClick r:id="rId5"/>
-              </a:rPr>
-              <a:t>https://apphammer.co</a:t>
-            </a:r>
-            <a:endParaRPr lang="en-US" dirty="0"/>
-          </a:p>
-        </p:txBody>
-      </p:sp>
+      </p:pic>
     </p:spTree>
     <p:extLst>
       <p:ext uri="{BB962C8B-B14F-4D97-AF65-F5344CB8AC3E}">
-        <p14:creationId xmlns:p14="http://schemas.microsoft.com/office/powerpoint/2010/main" val="1931690552"/>
+        <p14:creationId xmlns:p14="http://schemas.microsoft.com/office/powerpoint/2010/main" val="1855808196"/>
       </p:ext>
     </p:extLst>
   </p:cSld>
@@ -9291,6 +9147,144 @@
       </p:grpSpPr>
       <p:sp>
         <p:nvSpPr>
+          <p:cNvPr id="2" name="Title 1"/>
+          <p:cNvSpPr>
+            <a:spLocks noGrp="1"/>
+          </p:cNvSpPr>
+          <p:nvPr>
+            <p:ph type="title"/>
+          </p:nvPr>
+        </p:nvSpPr>
+        <p:spPr/>
+        <p:txBody>
+          <a:bodyPr/>
+          <a:lstStyle/>
+          <a:p>
+            <a:pPr marL="0" lvl="0" indent="0">
+              <a:buNone/>
+            </a:pPr>
+            <a:r>
+              <a:rPr dirty="0" err="1"/>
+              <a:t>Dockerhub</a:t>
+            </a:r>
+            <a:r>
+              <a:rPr dirty="0"/>
+              <a:t>: finding image</a:t>
+            </a:r>
+            <a:r>
+              <a:rPr lang="en-US" dirty="0"/>
+              <a:t>s</a:t>
+            </a:r>
+            <a:endParaRPr dirty="0"/>
+          </a:p>
+        </p:txBody>
+      </p:sp>
+      <p:sp>
+        <p:nvSpPr>
+          <p:cNvPr id="3" name="Content Placeholder 2"/>
+          <p:cNvSpPr>
+            <a:spLocks noGrp="1"/>
+          </p:cNvSpPr>
+          <p:nvPr>
+            <p:ph idx="1"/>
+          </p:nvPr>
+        </p:nvSpPr>
+        <p:spPr/>
+        <p:txBody>
+          <a:bodyPr/>
+          <a:lstStyle/>
+          <a:p>
+            <a:pPr lvl="0"/>
+            <a:r>
+              <a:rPr dirty="0" err="1"/>
+              <a:t>Dockerhub</a:t>
+            </a:r>
+            <a:r>
+              <a:rPr dirty="0"/>
+              <a:t> is an example of a container registry. </a:t>
+            </a:r>
+            <a:r>
+              <a:rPr dirty="0">
+                <a:hlinkClick r:id="rId2"/>
+              </a:rPr>
+              <a:t>https://hub.docker.com</a:t>
+            </a:r>
+            <a:r>
+              <a:rPr lang="en-US" dirty="0"/>
+              <a:t> </a:t>
+            </a:r>
+            <a:endParaRPr dirty="0"/>
+          </a:p>
+          <a:p>
+            <a:pPr lvl="0"/>
+            <a:r>
+              <a:rPr dirty="0"/>
+              <a:t>A catalog of container images in the cloud!</a:t>
+            </a:r>
+          </a:p>
+          <a:p>
+            <a:pPr lvl="0"/>
+            <a:r>
+              <a:rPr dirty="0">
+                <a:hlinkClick r:id="rId3"/>
+              </a:rPr>
+              <a:t>https://hub.docker.com/search?q=jupyter%2Fminimal-notebook</a:t>
+            </a:r>
+            <a:r>
+              <a:rPr lang="en-US" dirty="0"/>
+              <a:t> </a:t>
+            </a:r>
+          </a:p>
+          <a:p>
+            <a:pPr lvl="0"/>
+            <a:r>
+              <a:rPr lang="en-US" dirty="0"/>
+              <a:t>Red Hat's Quay.io is another:</a:t>
+            </a:r>
+            <a:br>
+              <a:rPr lang="en-US" dirty="0"/>
+            </a:br>
+            <a:r>
+              <a:rPr dirty="0">
+                <a:hlinkClick r:id="rId4"/>
+              </a:rPr>
+              <a:t>https://quay.io/repository/jupyter/minimal-notebook</a:t>
+            </a:r>
+            <a:r>
+              <a:rPr lang="en-US" dirty="0"/>
+              <a:t> </a:t>
+            </a:r>
+            <a:endParaRPr dirty="0"/>
+          </a:p>
+        </p:txBody>
+      </p:sp>
+    </p:spTree>
+  </p:cSld>
+  <p:clrMapOvr>
+    <a:masterClrMapping/>
+  </p:clrMapOvr>
+</p:sld>
+</file>
+
+<file path=ppt/slides/slide11.xml><?xml version="1.0" encoding="utf-8"?>
+<p:sld xmlns:a="http://schemas.openxmlformats.org/drawingml/2006/main" xmlns:r="http://schemas.openxmlformats.org/officeDocument/2006/relationships" xmlns:p="http://schemas.openxmlformats.org/presentationml/2006/main">
+  <p:cSld>
+    <p:spTree>
+      <p:nvGrpSpPr>
+        <p:cNvPr id="1" name=""/>
+        <p:cNvGrpSpPr/>
+        <p:nvPr/>
+      </p:nvGrpSpPr>
+      <p:grpSpPr>
+        <a:xfrm>
+          <a:off x="0" y="0"/>
+          <a:ext cx="0" cy="0"/>
+          <a:chOff x="0" y="0"/>
+          <a:chExt cx="0" cy="0"/>
+        </a:xfrm>
+      </p:grpSpPr>
+      <p:sp>
+        <p:nvSpPr>
           <p:cNvPr id="5" name="Content Placeholder 4">
             <a:extLst>
               <a:ext uri="{FF2B5EF4-FFF2-40B4-BE49-F238E27FC236}">
@@ -9387,7 +9381,7 @@
 </p:sld>
 </file>
 
-<file path=ppt/slides/slide11.xml><?xml version="1.0" encoding="utf-8"?>
+<file path=ppt/slides/slide12.xml><?xml version="1.0" encoding="utf-8"?>
 <p:sld xmlns:a="http://schemas.openxmlformats.org/drawingml/2006/main" xmlns:r="http://schemas.openxmlformats.org/officeDocument/2006/relationships" xmlns:p="http://schemas.openxmlformats.org/presentationml/2006/main">
   <p:cSld>
     <p:spTree>
@@ -9933,194 +9927,6 @@
 </p:sld>
 </file>
 
-<file path=ppt/slides/slide12.xml><?xml version="1.0" encoding="utf-8"?>
-<p:sld xmlns:a="http://schemas.openxmlformats.org/drawingml/2006/main" xmlns:r="http://schemas.openxmlformats.org/officeDocument/2006/relationships" xmlns:p="http://schemas.openxmlformats.org/presentationml/2006/main">
-  <p:cSld>
-    <p:spTree>
-      <p:nvGrpSpPr>
-        <p:cNvPr id="1" name=""/>
-        <p:cNvGrpSpPr/>
-        <p:nvPr/>
-      </p:nvGrpSpPr>
-      <p:grpSpPr>
-        <a:xfrm>
-          <a:off x="0" y="0"/>
-          <a:ext cx="0" cy="0"/>
-          <a:chOff x="0" y="0"/>
-          <a:chExt cx="0" cy="0"/>
-        </a:xfrm>
-      </p:grpSpPr>
-      <p:sp>
-        <p:nvSpPr>
-          <p:cNvPr id="2" name="Title 1"/>
-          <p:cNvSpPr>
-            <a:spLocks noGrp="1"/>
-          </p:cNvSpPr>
-          <p:nvPr>
-            <p:ph type="title"/>
-          </p:nvPr>
-        </p:nvSpPr>
-        <p:spPr/>
-        <p:txBody>
-          <a:bodyPr/>
-          <a:lstStyle/>
-          <a:p>
-            <a:pPr marL="0" lvl="0" indent="0">
-              <a:buNone/>
-            </a:pPr>
-            <a:r>
-              <a:rPr dirty="0"/>
-              <a:t>Running an image</a:t>
-            </a:r>
-            <a:r>
-              <a:rPr lang="en-US" dirty="0"/>
-              <a:t> as a container</a:t>
-            </a:r>
-            <a:endParaRPr dirty="0"/>
-          </a:p>
-        </p:txBody>
-      </p:sp>
-      <p:sp>
-        <p:nvSpPr>
-          <p:cNvPr id="3" name="Content Placeholder 2"/>
-          <p:cNvSpPr>
-            <a:spLocks noGrp="1"/>
-          </p:cNvSpPr>
-          <p:nvPr>
-            <p:ph idx="1"/>
-          </p:nvPr>
-        </p:nvSpPr>
-        <p:spPr/>
-        <p:txBody>
-          <a:bodyPr/>
-          <a:lstStyle/>
-          <a:p>
-            <a:pPr lvl="0"/>
-            <a:r>
-              <a:rPr lang="en-US" dirty="0"/>
-              <a:t>To run the image:</a:t>
-            </a:r>
-            <a:br>
-              <a:rPr lang="en-US" dirty="0"/>
-            </a:br>
-            <a:r>
-              <a:rPr dirty="0">
-                <a:solidFill>
-                  <a:schemeClr val="bg2">
-                    <a:lumMod val="50000"/>
-                  </a:schemeClr>
-                </a:solidFill>
-                <a:latin typeface="Consolas" panose="020B0609020204030204" pitchFamily="49" charset="0"/>
-              </a:rPr>
-              <a:t>docker run --name </a:t>
-            </a:r>
-            <a:r>
-              <a:rPr lang="en-US" dirty="0">
-                <a:solidFill>
-                  <a:schemeClr val="bg2">
-                    <a:lumMod val="50000"/>
-                  </a:schemeClr>
-                </a:solidFill>
-                <a:latin typeface="Consolas" panose="020B0609020204030204" pitchFamily="49" charset="0"/>
-              </a:rPr>
-              <a:t>&lt;</a:t>
-            </a:r>
-            <a:r>
-              <a:rPr lang="en-US" dirty="0" err="1">
-                <a:solidFill>
-                  <a:schemeClr val="bg2">
-                    <a:lumMod val="50000"/>
-                  </a:schemeClr>
-                </a:solidFill>
-                <a:latin typeface="Consolas" panose="020B0609020204030204" pitchFamily="49" charset="0"/>
-              </a:rPr>
-              <a:t>containername</a:t>
-            </a:r>
-            <a:r>
-              <a:rPr lang="en-US" dirty="0">
-                <a:solidFill>
-                  <a:schemeClr val="bg2">
-                    <a:lumMod val="50000"/>
-                  </a:schemeClr>
-                </a:solidFill>
-                <a:latin typeface="Consolas" panose="020B0609020204030204" pitchFamily="49" charset="0"/>
-              </a:rPr>
-              <a:t>&gt;</a:t>
-            </a:r>
-            <a:r>
-              <a:rPr dirty="0">
-                <a:solidFill>
-                  <a:schemeClr val="bg2">
-                    <a:lumMod val="50000"/>
-                  </a:schemeClr>
-                </a:solidFill>
-                <a:latin typeface="Consolas" panose="020B0609020204030204" pitchFamily="49" charset="0"/>
-              </a:rPr>
-              <a:t> -d </a:t>
-            </a:r>
-            <a:r>
-              <a:rPr lang="en-US" dirty="0">
-                <a:solidFill>
-                  <a:schemeClr val="bg2">
-                    <a:lumMod val="50000"/>
-                  </a:schemeClr>
-                </a:solidFill>
-                <a:latin typeface="Consolas" panose="020B0609020204030204" pitchFamily="49" charset="0"/>
-              </a:rPr>
-              <a:t>&lt;image&gt;:&lt;tag&gt;</a:t>
-            </a:r>
-          </a:p>
-          <a:p>
-            <a:pPr lvl="0"/>
-            <a:r>
-              <a:rPr dirty="0">
-                <a:solidFill>
-                  <a:schemeClr val="bg2">
-                    <a:lumMod val="50000"/>
-                  </a:schemeClr>
-                </a:solidFill>
-                <a:latin typeface="Consolas" panose="020B0609020204030204" pitchFamily="49" charset="0"/>
-              </a:rPr>
-              <a:t>--name </a:t>
-            </a:r>
-            <a:r>
-              <a:rPr dirty="0"/>
-              <a:t>give the container a name</a:t>
-            </a:r>
-            <a:r>
-              <a:rPr lang="en-US" dirty="0"/>
-              <a:t>. </a:t>
-            </a:r>
-            <a:endParaRPr dirty="0"/>
-          </a:p>
-          <a:p>
-            <a:pPr lvl="0"/>
-            <a:r>
-              <a:rPr dirty="0">
-                <a:solidFill>
-                  <a:schemeClr val="bg2">
-                    <a:lumMod val="50000"/>
-                  </a:schemeClr>
-                </a:solidFill>
-                <a:latin typeface="Consolas" panose="020B0609020204030204" pitchFamily="49" charset="0"/>
-              </a:rPr>
-              <a:t>-d </a:t>
-            </a:r>
-            <a:r>
-              <a:rPr dirty="0"/>
-              <a:t>run in the background, return to the console.</a:t>
-            </a:r>
-          </a:p>
-        </p:txBody>
-      </p:sp>
-    </p:spTree>
-  </p:cSld>
-  <p:clrMapOvr>
-    <a:masterClrMapping/>
-  </p:clrMapOvr>
-</p:sld>
-</file>
-
 <file path=ppt/slides/slide13.xml><?xml version="1.0" encoding="utf-8"?>
 <p:sld xmlns:a="http://schemas.openxmlformats.org/drawingml/2006/main" xmlns:r="http://schemas.openxmlformats.org/officeDocument/2006/relationships" xmlns:p="http://schemas.openxmlformats.org/presentationml/2006/main">
   <p:cSld>
@@ -10140,6 +9946,194 @@
       </p:grpSpPr>
       <p:sp>
         <p:nvSpPr>
+          <p:cNvPr id="2" name="Title 1"/>
+          <p:cNvSpPr>
+            <a:spLocks noGrp="1"/>
+          </p:cNvSpPr>
+          <p:nvPr>
+            <p:ph type="title"/>
+          </p:nvPr>
+        </p:nvSpPr>
+        <p:spPr/>
+        <p:txBody>
+          <a:bodyPr/>
+          <a:lstStyle/>
+          <a:p>
+            <a:pPr marL="0" lvl="0" indent="0">
+              <a:buNone/>
+            </a:pPr>
+            <a:r>
+              <a:rPr dirty="0"/>
+              <a:t>Running an image</a:t>
+            </a:r>
+            <a:r>
+              <a:rPr lang="en-US" dirty="0"/>
+              <a:t> as a container</a:t>
+            </a:r>
+            <a:endParaRPr dirty="0"/>
+          </a:p>
+        </p:txBody>
+      </p:sp>
+      <p:sp>
+        <p:nvSpPr>
+          <p:cNvPr id="3" name="Content Placeholder 2"/>
+          <p:cNvSpPr>
+            <a:spLocks noGrp="1"/>
+          </p:cNvSpPr>
+          <p:nvPr>
+            <p:ph idx="1"/>
+          </p:nvPr>
+        </p:nvSpPr>
+        <p:spPr/>
+        <p:txBody>
+          <a:bodyPr/>
+          <a:lstStyle/>
+          <a:p>
+            <a:pPr lvl="0"/>
+            <a:r>
+              <a:rPr lang="en-US" dirty="0"/>
+              <a:t>To run the image:</a:t>
+            </a:r>
+            <a:br>
+              <a:rPr lang="en-US" dirty="0"/>
+            </a:br>
+            <a:r>
+              <a:rPr dirty="0">
+                <a:solidFill>
+                  <a:schemeClr val="bg2">
+                    <a:lumMod val="50000"/>
+                  </a:schemeClr>
+                </a:solidFill>
+                <a:latin typeface="Consolas" panose="020B0609020204030204" pitchFamily="49" charset="0"/>
+              </a:rPr>
+              <a:t>docker run --name </a:t>
+            </a:r>
+            <a:r>
+              <a:rPr lang="en-US" dirty="0">
+                <a:solidFill>
+                  <a:schemeClr val="bg2">
+                    <a:lumMod val="50000"/>
+                  </a:schemeClr>
+                </a:solidFill>
+                <a:latin typeface="Consolas" panose="020B0609020204030204" pitchFamily="49" charset="0"/>
+              </a:rPr>
+              <a:t>&lt;</a:t>
+            </a:r>
+            <a:r>
+              <a:rPr lang="en-US" dirty="0" err="1">
+                <a:solidFill>
+                  <a:schemeClr val="bg2">
+                    <a:lumMod val="50000"/>
+                  </a:schemeClr>
+                </a:solidFill>
+                <a:latin typeface="Consolas" panose="020B0609020204030204" pitchFamily="49" charset="0"/>
+              </a:rPr>
+              <a:t>containername</a:t>
+            </a:r>
+            <a:r>
+              <a:rPr lang="en-US" dirty="0">
+                <a:solidFill>
+                  <a:schemeClr val="bg2">
+                    <a:lumMod val="50000"/>
+                  </a:schemeClr>
+                </a:solidFill>
+                <a:latin typeface="Consolas" panose="020B0609020204030204" pitchFamily="49" charset="0"/>
+              </a:rPr>
+              <a:t>&gt;</a:t>
+            </a:r>
+            <a:r>
+              <a:rPr dirty="0">
+                <a:solidFill>
+                  <a:schemeClr val="bg2">
+                    <a:lumMod val="50000"/>
+                  </a:schemeClr>
+                </a:solidFill>
+                <a:latin typeface="Consolas" panose="020B0609020204030204" pitchFamily="49" charset="0"/>
+              </a:rPr>
+              <a:t> -d </a:t>
+            </a:r>
+            <a:r>
+              <a:rPr lang="en-US" dirty="0">
+                <a:solidFill>
+                  <a:schemeClr val="bg2">
+                    <a:lumMod val="50000"/>
+                  </a:schemeClr>
+                </a:solidFill>
+                <a:latin typeface="Consolas" panose="020B0609020204030204" pitchFamily="49" charset="0"/>
+              </a:rPr>
+              <a:t>&lt;image&gt;:&lt;tag&gt;</a:t>
+            </a:r>
+          </a:p>
+          <a:p>
+            <a:pPr lvl="0"/>
+            <a:r>
+              <a:rPr dirty="0">
+                <a:solidFill>
+                  <a:schemeClr val="bg2">
+                    <a:lumMod val="50000"/>
+                  </a:schemeClr>
+                </a:solidFill>
+                <a:latin typeface="Consolas" panose="020B0609020204030204" pitchFamily="49" charset="0"/>
+              </a:rPr>
+              <a:t>--name </a:t>
+            </a:r>
+            <a:r>
+              <a:rPr dirty="0"/>
+              <a:t>give the container a name</a:t>
+            </a:r>
+            <a:r>
+              <a:rPr lang="en-US" dirty="0"/>
+              <a:t>. </a:t>
+            </a:r>
+            <a:endParaRPr dirty="0"/>
+          </a:p>
+          <a:p>
+            <a:pPr lvl="0"/>
+            <a:r>
+              <a:rPr dirty="0">
+                <a:solidFill>
+                  <a:schemeClr val="bg2">
+                    <a:lumMod val="50000"/>
+                  </a:schemeClr>
+                </a:solidFill>
+                <a:latin typeface="Consolas" panose="020B0609020204030204" pitchFamily="49" charset="0"/>
+              </a:rPr>
+              <a:t>-d </a:t>
+            </a:r>
+            <a:r>
+              <a:rPr dirty="0"/>
+              <a:t>run in the background, return to the console.</a:t>
+            </a:r>
+          </a:p>
+        </p:txBody>
+      </p:sp>
+    </p:spTree>
+  </p:cSld>
+  <p:clrMapOvr>
+    <a:masterClrMapping/>
+  </p:clrMapOvr>
+</p:sld>
+</file>
+
+<file path=ppt/slides/slide14.xml><?xml version="1.0" encoding="utf-8"?>
+<p:sld xmlns:a="http://schemas.openxmlformats.org/drawingml/2006/main" xmlns:r="http://schemas.openxmlformats.org/officeDocument/2006/relationships" xmlns:p="http://schemas.openxmlformats.org/presentationml/2006/main">
+  <p:cSld>
+    <p:spTree>
+      <p:nvGrpSpPr>
+        <p:cNvPr id="1" name=""/>
+        <p:cNvGrpSpPr/>
+        <p:nvPr/>
+      </p:nvGrpSpPr>
+      <p:grpSpPr>
+        <a:xfrm>
+          <a:off x="0" y="0"/>
+          <a:ext cx="0" cy="0"/>
+          <a:chOff x="0" y="0"/>
+          <a:chExt cx="0" cy="0"/>
+        </a:xfrm>
+      </p:grpSpPr>
+      <p:sp>
+        <p:nvSpPr>
           <p:cNvPr id="5" name="Content Placeholder 4">
             <a:extLst>
               <a:ext uri="{FF2B5EF4-FFF2-40B4-BE49-F238E27FC236}">
@@ -10237,7 +10231,7 @@
 </p:sld>
 </file>
 
-<file path=ppt/slides/slide14.xml><?xml version="1.0" encoding="utf-8"?>
+<file path=ppt/slides/slide15.xml><?xml version="1.0" encoding="utf-8"?>
 <p:sld xmlns:a="http://schemas.openxmlformats.org/drawingml/2006/main" xmlns:r="http://schemas.openxmlformats.org/officeDocument/2006/relationships" xmlns:p="http://schemas.openxmlformats.org/presentationml/2006/main">
   <p:cSld>
     <p:spTree>
@@ -11041,178 +11035,6 @@
 </p:sld>
 </file>
 
-<file path=ppt/slides/slide15.xml><?xml version="1.0" encoding="utf-8"?>
-<p:sld xmlns:a="http://schemas.openxmlformats.org/drawingml/2006/main" xmlns:r="http://schemas.openxmlformats.org/officeDocument/2006/relationships" xmlns:p="http://schemas.openxmlformats.org/presentationml/2006/main">
-  <p:cSld>
-    <p:spTree>
-      <p:nvGrpSpPr>
-        <p:cNvPr id="1" name=""/>
-        <p:cNvGrpSpPr/>
-        <p:nvPr/>
-      </p:nvGrpSpPr>
-      <p:grpSpPr>
-        <a:xfrm>
-          <a:off x="0" y="0"/>
-          <a:ext cx="0" cy="0"/>
-          <a:chOff x="0" y="0"/>
-          <a:chExt cx="0" cy="0"/>
-        </a:xfrm>
-      </p:grpSpPr>
-      <p:sp>
-        <p:nvSpPr>
-          <p:cNvPr id="2" name="Title 1"/>
-          <p:cNvSpPr>
-            <a:spLocks noGrp="1"/>
-          </p:cNvSpPr>
-          <p:nvPr>
-            <p:ph type="title"/>
-          </p:nvPr>
-        </p:nvSpPr>
-        <p:spPr/>
-        <p:txBody>
-          <a:bodyPr/>
-          <a:lstStyle/>
-          <a:p>
-            <a:pPr marL="0" lvl="0" indent="0">
-              <a:buNone/>
-            </a:pPr>
-            <a:r>
-              <a:rPr lang="en-US" dirty="0"/>
-              <a:t>Publishing TCP/UDP Ports</a:t>
-            </a:r>
-            <a:endParaRPr dirty="0"/>
-          </a:p>
-        </p:txBody>
-      </p:sp>
-      <p:sp>
-        <p:nvSpPr>
-          <p:cNvPr id="3" name="Content Placeholder 2"/>
-          <p:cNvSpPr>
-            <a:spLocks noGrp="1"/>
-          </p:cNvSpPr>
-          <p:nvPr>
-            <p:ph idx="1"/>
-          </p:nvPr>
-        </p:nvSpPr>
-        <p:spPr>
-          <a:xfrm>
-            <a:off x="628650" y="1192306"/>
-            <a:ext cx="7886700" cy="3441321"/>
-          </a:xfrm>
-        </p:spPr>
-        <p:txBody>
-          <a:bodyPr>
-            <a:normAutofit lnSpcReduction="10000"/>
-          </a:bodyPr>
-          <a:lstStyle/>
-          <a:p>
-            <a:pPr lvl="0"/>
-            <a:r>
-              <a:rPr lang="en-US" dirty="0"/>
-              <a:t>What good is running an application in a container if you cannot access it?</a:t>
-            </a:r>
-          </a:p>
-          <a:p>
-            <a:pPr lvl="0"/>
-            <a:r>
-              <a:rPr lang="en-US" dirty="0"/>
-              <a:t>When the container is created, we must publish the exposed the port:</a:t>
-            </a:r>
-          </a:p>
-          <a:p>
-            <a:pPr marL="342891" lvl="1" indent="0">
-              <a:buNone/>
-            </a:pPr>
-            <a:r>
-              <a:rPr lang="en-US" sz="2200" dirty="0">
-                <a:solidFill>
-                  <a:schemeClr val="bg2">
-                    <a:lumMod val="50000"/>
-                  </a:schemeClr>
-                </a:solidFill>
-                <a:latin typeface="Consolas" panose="020B0609020204030204" pitchFamily="49" charset="0"/>
-              </a:rPr>
-              <a:t>-p </a:t>
-            </a:r>
-            <a:r>
-              <a:rPr lang="en-US" sz="2200" dirty="0" err="1">
-                <a:solidFill>
-                  <a:schemeClr val="bg2">
-                    <a:lumMod val="50000"/>
-                  </a:schemeClr>
-                </a:solidFill>
-                <a:latin typeface="Consolas" panose="020B0609020204030204" pitchFamily="49" charset="0"/>
-              </a:rPr>
-              <a:t>published-port:exposed-port</a:t>
-            </a:r>
-            <a:r>
-              <a:rPr lang="en-US" sz="2200" dirty="0">
-                <a:solidFill>
-                  <a:schemeClr val="bg2">
-                    <a:lumMod val="50000"/>
-                  </a:schemeClr>
-                </a:solidFill>
-                <a:latin typeface="Consolas" panose="020B0609020204030204" pitchFamily="49" charset="0"/>
-              </a:rPr>
-              <a:t> </a:t>
-            </a:r>
-            <a:r>
-              <a:rPr lang="en-US" sz="2200" dirty="0"/>
-              <a:t>or</a:t>
-            </a:r>
-            <a:endParaRPr lang="en-US" sz="2200" dirty="0">
-              <a:solidFill>
-                <a:schemeClr val="bg2">
-                  <a:lumMod val="50000"/>
-                </a:schemeClr>
-              </a:solidFill>
-              <a:latin typeface="Consolas" panose="020B0609020204030204" pitchFamily="49" charset="0"/>
-            </a:endParaRPr>
-          </a:p>
-          <a:p>
-            <a:pPr marL="342891" lvl="1" indent="0">
-              <a:buNone/>
-            </a:pPr>
-            <a:r>
-              <a:rPr sz="2200" dirty="0">
-                <a:solidFill>
-                  <a:schemeClr val="bg2">
-                    <a:lumMod val="50000"/>
-                  </a:schemeClr>
-                </a:solidFill>
-                <a:latin typeface="Consolas" panose="020B0609020204030204" pitchFamily="49" charset="0"/>
-              </a:rPr>
-              <a:t>-p OUTSIDE:INSIDE</a:t>
-            </a:r>
-          </a:p>
-          <a:p>
-            <a:pPr lvl="0"/>
-            <a:r>
-              <a:rPr lang="en-US" dirty="0"/>
-              <a:t>When you publish a port, you can connect to exposed application services on the published port.</a:t>
-            </a:r>
-          </a:p>
-          <a:p>
-            <a:pPr lvl="0"/>
-            <a:r>
-              <a:rPr lang="en-US" dirty="0"/>
-              <a:t>For example, if 8888 is published, then </a:t>
-            </a:r>
-            <a:r>
-              <a:rPr dirty="0"/>
-              <a:t>http://localhost:8888</a:t>
-            </a:r>
-          </a:p>
-        </p:txBody>
-      </p:sp>
-    </p:spTree>
-  </p:cSld>
-  <p:clrMapOvr>
-    <a:masterClrMapping/>
-  </p:clrMapOvr>
-</p:sld>
-</file>
-
 <file path=ppt/slides/slide16.xml><?xml version="1.0" encoding="utf-8"?>
 <p:sld xmlns:a="http://schemas.openxmlformats.org/drawingml/2006/main" xmlns:r="http://schemas.openxmlformats.org/officeDocument/2006/relationships" xmlns:p="http://schemas.openxmlformats.org/presentationml/2006/main">
   <p:cSld>
@@ -11232,6 +11054,178 @@
       </p:grpSpPr>
       <p:sp>
         <p:nvSpPr>
+          <p:cNvPr id="2" name="Title 1"/>
+          <p:cNvSpPr>
+            <a:spLocks noGrp="1"/>
+          </p:cNvSpPr>
+          <p:nvPr>
+            <p:ph type="title"/>
+          </p:nvPr>
+        </p:nvSpPr>
+        <p:spPr/>
+        <p:txBody>
+          <a:bodyPr/>
+          <a:lstStyle/>
+          <a:p>
+            <a:pPr marL="0" lvl="0" indent="0">
+              <a:buNone/>
+            </a:pPr>
+            <a:r>
+              <a:rPr lang="en-US" dirty="0"/>
+              <a:t>Publishing TCP/UDP Ports</a:t>
+            </a:r>
+            <a:endParaRPr dirty="0"/>
+          </a:p>
+        </p:txBody>
+      </p:sp>
+      <p:sp>
+        <p:nvSpPr>
+          <p:cNvPr id="3" name="Content Placeholder 2"/>
+          <p:cNvSpPr>
+            <a:spLocks noGrp="1"/>
+          </p:cNvSpPr>
+          <p:nvPr>
+            <p:ph idx="1"/>
+          </p:nvPr>
+        </p:nvSpPr>
+        <p:spPr>
+          <a:xfrm>
+            <a:off x="628650" y="1192306"/>
+            <a:ext cx="7886700" cy="3441321"/>
+          </a:xfrm>
+        </p:spPr>
+        <p:txBody>
+          <a:bodyPr>
+            <a:normAutofit lnSpcReduction="10000"/>
+          </a:bodyPr>
+          <a:lstStyle/>
+          <a:p>
+            <a:pPr lvl="0"/>
+            <a:r>
+              <a:rPr lang="en-US" dirty="0"/>
+              <a:t>What good is running an application in a container if you cannot access it?</a:t>
+            </a:r>
+          </a:p>
+          <a:p>
+            <a:pPr lvl="0"/>
+            <a:r>
+              <a:rPr lang="en-US" dirty="0"/>
+              <a:t>When the container is created, we must publish the exposed the port:</a:t>
+            </a:r>
+          </a:p>
+          <a:p>
+            <a:pPr marL="342891" lvl="1" indent="0">
+              <a:buNone/>
+            </a:pPr>
+            <a:r>
+              <a:rPr lang="en-US" sz="2200" dirty="0">
+                <a:solidFill>
+                  <a:schemeClr val="bg2">
+                    <a:lumMod val="50000"/>
+                  </a:schemeClr>
+                </a:solidFill>
+                <a:latin typeface="Consolas" panose="020B0609020204030204" pitchFamily="49" charset="0"/>
+              </a:rPr>
+              <a:t>-p </a:t>
+            </a:r>
+            <a:r>
+              <a:rPr lang="en-US" sz="2200" dirty="0" err="1">
+                <a:solidFill>
+                  <a:schemeClr val="bg2">
+                    <a:lumMod val="50000"/>
+                  </a:schemeClr>
+                </a:solidFill>
+                <a:latin typeface="Consolas" panose="020B0609020204030204" pitchFamily="49" charset="0"/>
+              </a:rPr>
+              <a:t>published-port:exposed-port</a:t>
+            </a:r>
+            <a:r>
+              <a:rPr lang="en-US" sz="2200" dirty="0">
+                <a:solidFill>
+                  <a:schemeClr val="bg2">
+                    <a:lumMod val="50000"/>
+                  </a:schemeClr>
+                </a:solidFill>
+                <a:latin typeface="Consolas" panose="020B0609020204030204" pitchFamily="49" charset="0"/>
+              </a:rPr>
+              <a:t> </a:t>
+            </a:r>
+            <a:r>
+              <a:rPr lang="en-US" sz="2200" dirty="0"/>
+              <a:t>or</a:t>
+            </a:r>
+            <a:endParaRPr lang="en-US" sz="2200" dirty="0">
+              <a:solidFill>
+                <a:schemeClr val="bg2">
+                  <a:lumMod val="50000"/>
+                </a:schemeClr>
+              </a:solidFill>
+              <a:latin typeface="Consolas" panose="020B0609020204030204" pitchFamily="49" charset="0"/>
+            </a:endParaRPr>
+          </a:p>
+          <a:p>
+            <a:pPr marL="342891" lvl="1" indent="0">
+              <a:buNone/>
+            </a:pPr>
+            <a:r>
+              <a:rPr sz="2200" dirty="0">
+                <a:solidFill>
+                  <a:schemeClr val="bg2">
+                    <a:lumMod val="50000"/>
+                  </a:schemeClr>
+                </a:solidFill>
+                <a:latin typeface="Consolas" panose="020B0609020204030204" pitchFamily="49" charset="0"/>
+              </a:rPr>
+              <a:t>-p OUTSIDE:INSIDE</a:t>
+            </a:r>
+          </a:p>
+          <a:p>
+            <a:pPr lvl="0"/>
+            <a:r>
+              <a:rPr lang="en-US" dirty="0"/>
+              <a:t>When you publish a port, you can connect to exposed application services on the published port.</a:t>
+            </a:r>
+          </a:p>
+          <a:p>
+            <a:pPr lvl="0"/>
+            <a:r>
+              <a:rPr lang="en-US" dirty="0"/>
+              <a:t>For example, if 8888 is published, then </a:t>
+            </a:r>
+            <a:r>
+              <a:rPr dirty="0"/>
+              <a:t>http://localhost:8888</a:t>
+            </a:r>
+          </a:p>
+        </p:txBody>
+      </p:sp>
+    </p:spTree>
+  </p:cSld>
+  <p:clrMapOvr>
+    <a:masterClrMapping/>
+  </p:clrMapOvr>
+</p:sld>
+</file>
+
+<file path=ppt/slides/slide17.xml><?xml version="1.0" encoding="utf-8"?>
+<p:sld xmlns:a="http://schemas.openxmlformats.org/drawingml/2006/main" xmlns:r="http://schemas.openxmlformats.org/officeDocument/2006/relationships" xmlns:p="http://schemas.openxmlformats.org/presentationml/2006/main">
+  <p:cSld>
+    <p:spTree>
+      <p:nvGrpSpPr>
+        <p:cNvPr id="1" name=""/>
+        <p:cNvGrpSpPr/>
+        <p:nvPr/>
+      </p:nvGrpSpPr>
+      <p:grpSpPr>
+        <a:xfrm>
+          <a:off x="0" y="0"/>
+          <a:ext cx="0" cy="0"/>
+          <a:chOff x="0" y="0"/>
+          <a:chExt cx="0" cy="0"/>
+        </a:xfrm>
+      </p:grpSpPr>
+      <p:sp>
+        <p:nvSpPr>
           <p:cNvPr id="5" name="Content Placeholder 4">
             <a:extLst>
               <a:ext uri="{FF2B5EF4-FFF2-40B4-BE49-F238E27FC236}">
@@ -11323,7 +11317,7 @@
 </p:sld>
 </file>
 
-<file path=ppt/slides/slide17.xml><?xml version="1.0" encoding="utf-8"?>
+<file path=ppt/slides/slide18.xml><?xml version="1.0" encoding="utf-8"?>
 <p:sld xmlns:a="http://schemas.openxmlformats.org/drawingml/2006/main" xmlns:r="http://schemas.openxmlformats.org/officeDocument/2006/relationships" xmlns:p="http://schemas.openxmlformats.org/presentationml/2006/main">
   <p:cSld>
     <p:spTree>
@@ -11679,175 +11673,6 @@
 </p:sld>
 </file>
 
-<file path=ppt/slides/slide18.xml><?xml version="1.0" encoding="utf-8"?>
-<p:sld xmlns:a="http://schemas.openxmlformats.org/drawingml/2006/main" xmlns:r="http://schemas.openxmlformats.org/officeDocument/2006/relationships" xmlns:p="http://schemas.openxmlformats.org/presentationml/2006/main">
-  <p:cSld>
-    <p:spTree>
-      <p:nvGrpSpPr>
-        <p:cNvPr id="1" name=""/>
-        <p:cNvGrpSpPr/>
-        <p:nvPr/>
-      </p:nvGrpSpPr>
-      <p:grpSpPr>
-        <a:xfrm>
-          <a:off x="0" y="0"/>
-          <a:ext cx="0" cy="0"/>
-          <a:chOff x="0" y="0"/>
-          <a:chExt cx="0" cy="0"/>
-        </a:xfrm>
-      </p:grpSpPr>
-      <p:sp>
-        <p:nvSpPr>
-          <p:cNvPr id="2" name="Title 1"/>
-          <p:cNvSpPr>
-            <a:spLocks noGrp="1"/>
-          </p:cNvSpPr>
-          <p:nvPr>
-            <p:ph type="title"/>
-          </p:nvPr>
-        </p:nvSpPr>
-        <p:spPr/>
-        <p:txBody>
-          <a:bodyPr/>
-          <a:lstStyle/>
-          <a:p>
-            <a:pPr marL="0" lvl="0" indent="0">
-              <a:buNone/>
-            </a:pPr>
-            <a:r>
-              <a:t>Need for volumes</a:t>
-            </a:r>
-          </a:p>
-        </p:txBody>
-      </p:sp>
-      <p:sp>
-        <p:nvSpPr>
-          <p:cNvPr id="3" name="Content Placeholder 2"/>
-          <p:cNvSpPr>
-            <a:spLocks noGrp="1"/>
-          </p:cNvSpPr>
-          <p:nvPr>
-            <p:ph idx="1"/>
-          </p:nvPr>
-        </p:nvSpPr>
-        <p:spPr/>
-        <p:txBody>
-          <a:bodyPr>
-            <a:normAutofit/>
-          </a:bodyPr>
-          <a:lstStyle/>
-          <a:p>
-            <a:pPr lvl="0"/>
-            <a:r>
-              <a:rPr lang="en-US" dirty="0"/>
-              <a:t>Containers are ephemeral. Only what is in the image is retained between subsequent runs.</a:t>
-            </a:r>
-          </a:p>
-          <a:p>
-            <a:pPr lvl="0"/>
-            <a:r>
-              <a:rPr lang="en-US" dirty="0"/>
-              <a:t>When you </a:t>
-            </a:r>
-            <a:r>
-              <a:rPr lang="en-US" dirty="0">
-                <a:solidFill>
-                  <a:schemeClr val="bg2">
-                    <a:lumMod val="50000"/>
-                  </a:schemeClr>
-                </a:solidFill>
-                <a:latin typeface="Consolas" panose="020B0609020204030204" pitchFamily="49" charset="0"/>
-              </a:rPr>
-              <a:t>docker rm </a:t>
-            </a:r>
-            <a:r>
-              <a:rPr lang="en-US" dirty="0"/>
-              <a:t>the changes are gone!</a:t>
-            </a:r>
-          </a:p>
-          <a:p>
-            <a:pPr lvl="0"/>
-            <a:r>
-              <a:rPr lang="en-US" dirty="0"/>
-              <a:t>How does one save changes? Volumes!</a:t>
-            </a:r>
-          </a:p>
-          <a:p>
-            <a:pPr marL="342891" lvl="1" indent="0">
-              <a:buNone/>
-            </a:pPr>
-            <a:r>
-              <a:rPr lang="en-US" sz="2400" dirty="0">
-                <a:solidFill>
-                  <a:schemeClr val="bg2">
-                    <a:lumMod val="50000"/>
-                  </a:schemeClr>
-                </a:solidFill>
-                <a:latin typeface="Consolas" panose="020B0609020204030204" pitchFamily="49" charset="0"/>
-              </a:rPr>
-              <a:t>-v </a:t>
-            </a:r>
-            <a:r>
-              <a:rPr lang="en-US" sz="2400" dirty="0" err="1">
-                <a:solidFill>
-                  <a:schemeClr val="bg2">
-                    <a:lumMod val="50000"/>
-                  </a:schemeClr>
-                </a:solidFill>
-                <a:latin typeface="Consolas" panose="020B0609020204030204" pitchFamily="49" charset="0"/>
-              </a:rPr>
-              <a:t>host:image</a:t>
-            </a:r>
-            <a:r>
-              <a:rPr lang="en-US" sz="2400" dirty="0">
-                <a:solidFill>
-                  <a:schemeClr val="bg2">
-                    <a:lumMod val="50000"/>
-                  </a:schemeClr>
-                </a:solidFill>
-                <a:latin typeface="Consolas" panose="020B0609020204030204" pitchFamily="49" charset="0"/>
-              </a:rPr>
-              <a:t> </a:t>
-            </a:r>
-            <a:r>
-              <a:rPr lang="en-US" sz="2400" dirty="0"/>
-              <a:t>or</a:t>
-            </a:r>
-            <a:endParaRPr lang="en-US" sz="2400" dirty="0">
-              <a:solidFill>
-                <a:schemeClr val="bg2">
-                  <a:lumMod val="50000"/>
-                </a:schemeClr>
-              </a:solidFill>
-              <a:latin typeface="Consolas" panose="020B0609020204030204" pitchFamily="49" charset="0"/>
-            </a:endParaRPr>
-          </a:p>
-          <a:p>
-            <a:pPr marL="342891" lvl="1" indent="0">
-              <a:buNone/>
-            </a:pPr>
-            <a:r>
-              <a:rPr lang="en-US" sz="2400" dirty="0">
-                <a:solidFill>
-                  <a:schemeClr val="bg2">
-                    <a:lumMod val="50000"/>
-                  </a:schemeClr>
-                </a:solidFill>
-                <a:latin typeface="Consolas" panose="020B0609020204030204" pitchFamily="49" charset="0"/>
-              </a:rPr>
-              <a:t>-v OUTSIDE:INSIDE</a:t>
-            </a:r>
-          </a:p>
-        </p:txBody>
-      </p:sp>
-    </p:spTree>
-  </p:cSld>
-  <p:clrMapOvr>
-    <a:masterClrMapping/>
-  </p:clrMapOvr>
-</p:sld>
-</file>
-
 <file path=ppt/slides/slide19.xml><?xml version="1.0" encoding="utf-8"?>
 <p:sld xmlns:a="http://schemas.openxmlformats.org/drawingml/2006/main" xmlns:r="http://schemas.openxmlformats.org/officeDocument/2006/relationships" xmlns:p="http://schemas.openxmlformats.org/presentationml/2006/main">
   <p:cSld>
@@ -11867,13 +11692,31 @@
       </p:grpSpPr>
       <p:sp>
         <p:nvSpPr>
-          <p:cNvPr id="5" name="Content Placeholder 4">
-            <a:extLst>
-              <a:ext uri="{FF2B5EF4-FFF2-40B4-BE49-F238E27FC236}">
-                <a16:creationId xmlns:a16="http://schemas.microsoft.com/office/drawing/2014/main" id="{433261ED-928A-F607-5867-AD82700BDF1E}"/>
-              </a:ext>
-            </a:extLst>
-          </p:cNvPr>
+          <p:cNvPr id="2" name="Title 1"/>
+          <p:cNvSpPr>
+            <a:spLocks noGrp="1"/>
+          </p:cNvSpPr>
+          <p:nvPr>
+            <p:ph type="title"/>
+          </p:nvPr>
+        </p:nvSpPr>
+        <p:spPr/>
+        <p:txBody>
+          <a:bodyPr/>
+          <a:lstStyle/>
+          <a:p>
+            <a:pPr marL="0" lvl="0" indent="0">
+              <a:buNone/>
+            </a:pPr>
+            <a:r>
+              <a:t>Need for volumes</a:t>
+            </a:r>
+          </a:p>
+        </p:txBody>
+      </p:sp>
+      <p:sp>
+        <p:nvSpPr>
+          <p:cNvPr id="3" name="Content Placeholder 2"/>
           <p:cNvSpPr>
             <a:spLocks noGrp="1"/>
           </p:cNvSpPr>
@@ -11881,102 +11724,117 @@
             <p:ph idx="1"/>
           </p:nvPr>
         </p:nvSpPr>
-        <p:spPr>
-          <a:xfrm>
-            <a:off x="2295939" y="1268016"/>
-            <a:ext cx="6492737" cy="3364707"/>
-          </a:xfrm>
-        </p:spPr>
-        <p:txBody>
-          <a:bodyPr/>
-          <a:lstStyle/>
-          <a:p>
-            <a:r>
-              <a:rPr lang="en-US" dirty="0"/>
-              <a:t>In the running container save a file.</a:t>
-            </a:r>
-          </a:p>
-          <a:p>
-            <a:r>
-              <a:rPr lang="en-US" dirty="0"/>
-              <a:t>Stop and remove the container</a:t>
-            </a:r>
-          </a:p>
-          <a:p>
-            <a:r>
-              <a:rPr lang="en-US" dirty="0"/>
-              <a:t>Re-run the container</a:t>
-            </a:r>
-          </a:p>
-          <a:p>
-            <a:r>
-              <a:rPr lang="en-US" dirty="0"/>
-              <a:t>Check back into the App… file is gone. Ephemeral.</a:t>
-            </a:r>
-          </a:p>
-          <a:p>
-            <a:r>
-              <a:rPr lang="en-US" dirty="0"/>
-              <a:t>Stop and remove the container… again</a:t>
-            </a:r>
-          </a:p>
-          <a:p>
-            <a:r>
-              <a:rPr lang="en-US" dirty="0"/>
-              <a:t>Check out that local work folder</a:t>
-            </a:r>
-          </a:p>
-          <a:p>
-            <a:r>
-              <a:rPr lang="en-US" dirty="0"/>
-              <a:t>Mount that folder as a container volume</a:t>
-            </a:r>
-          </a:p>
-          <a:p>
-            <a:r>
-              <a:rPr lang="en-US" dirty="0"/>
-              <a:t>Stop and remove the container… last time</a:t>
-            </a:r>
-          </a:p>
-          <a:p>
-            <a:endParaRPr lang="en-US" dirty="0"/>
-          </a:p>
-        </p:txBody>
-      </p:sp>
-      <p:sp>
-        <p:nvSpPr>
-          <p:cNvPr id="4" name="Title 3">
-            <a:extLst>
-              <a:ext uri="{FF2B5EF4-FFF2-40B4-BE49-F238E27FC236}">
-                <a16:creationId xmlns:a16="http://schemas.microsoft.com/office/drawing/2014/main" id="{81476FC7-4678-4EE6-A902-ACE370E6715F}"/>
-              </a:ext>
-            </a:extLst>
-          </p:cNvPr>
-          <p:cNvSpPr>
-            <a:spLocks noGrp="1"/>
-          </p:cNvSpPr>
-          <p:nvPr>
-            <p:ph type="title"/>
-          </p:nvPr>
-        </p:nvSpPr>
         <p:spPr/>
         <p:txBody>
-          <a:bodyPr/>
+          <a:bodyPr>
+            <a:normAutofit/>
+          </a:bodyPr>
           <a:lstStyle/>
           <a:p>
-            <a:r>
-              <a:rPr lang="en-US" dirty="0"/>
-              <a:t>Demo 4: Volumes</a:t>
+            <a:pPr lvl="0"/>
+            <a:r>
+              <a:rPr lang="en-US" dirty="0"/>
+              <a:t>Containers are ephemeral. Only what is in the image is retained between subsequent runs.</a:t>
+            </a:r>
+          </a:p>
+          <a:p>
+            <a:pPr lvl="0"/>
+            <a:r>
+              <a:rPr lang="en-US" dirty="0"/>
+              <a:t>When you </a:t>
+            </a:r>
+            <a:r>
+              <a:rPr lang="en-US" dirty="0">
+                <a:solidFill>
+                  <a:schemeClr val="bg2">
+                    <a:lumMod val="50000"/>
+                  </a:schemeClr>
+                </a:solidFill>
+                <a:latin typeface="Consolas" panose="020B0609020204030204" pitchFamily="49" charset="0"/>
+              </a:rPr>
+              <a:t>docker rm </a:t>
+            </a:r>
+            <a:r>
+              <a:rPr lang="en-US" dirty="0"/>
+              <a:t>the changes are gone!</a:t>
+            </a:r>
+          </a:p>
+          <a:p>
+            <a:pPr lvl="0"/>
+            <a:r>
+              <a:rPr lang="en-US" dirty="0"/>
+              <a:t>How does one save changes? Volumes!</a:t>
+            </a:r>
+          </a:p>
+          <a:p>
+            <a:pPr marL="342891" lvl="1" indent="0">
+              <a:buNone/>
+            </a:pPr>
+            <a:r>
+              <a:rPr lang="en-US" sz="2400" dirty="0">
+                <a:solidFill>
+                  <a:schemeClr val="bg2">
+                    <a:lumMod val="50000"/>
+                  </a:schemeClr>
+                </a:solidFill>
+                <a:latin typeface="Consolas" panose="020B0609020204030204" pitchFamily="49" charset="0"/>
+              </a:rPr>
+              <a:t>-v </a:t>
+            </a:r>
+            <a:r>
+              <a:rPr lang="en-US" sz="2400" dirty="0" err="1">
+                <a:solidFill>
+                  <a:schemeClr val="bg2">
+                    <a:lumMod val="50000"/>
+                  </a:schemeClr>
+                </a:solidFill>
+                <a:latin typeface="Consolas" panose="020B0609020204030204" pitchFamily="49" charset="0"/>
+              </a:rPr>
+              <a:t>host:image</a:t>
+            </a:r>
+            <a:r>
+              <a:rPr lang="en-US" sz="2400" dirty="0">
+                <a:solidFill>
+                  <a:schemeClr val="bg2">
+                    <a:lumMod val="50000"/>
+                  </a:schemeClr>
+                </a:solidFill>
+                <a:latin typeface="Consolas" panose="020B0609020204030204" pitchFamily="49" charset="0"/>
+              </a:rPr>
+              <a:t> </a:t>
+            </a:r>
+            <a:r>
+              <a:rPr lang="en-US" sz="2400" dirty="0"/>
+              <a:t>or</a:t>
+            </a:r>
+            <a:endParaRPr lang="en-US" sz="2400" dirty="0">
+              <a:solidFill>
+                <a:schemeClr val="bg2">
+                  <a:lumMod val="50000"/>
+                </a:schemeClr>
+              </a:solidFill>
+              <a:latin typeface="Consolas" panose="020B0609020204030204" pitchFamily="49" charset="0"/>
+            </a:endParaRPr>
+          </a:p>
+          <a:p>
+            <a:pPr marL="342891" lvl="1" indent="0">
+              <a:buNone/>
+            </a:pPr>
+            <a:r>
+              <a:rPr lang="en-US" sz="2400" dirty="0">
+                <a:solidFill>
+                  <a:schemeClr val="bg2">
+                    <a:lumMod val="50000"/>
+                  </a:schemeClr>
+                </a:solidFill>
+                <a:latin typeface="Consolas" panose="020B0609020204030204" pitchFamily="49" charset="0"/>
+              </a:rPr>
+              <a:t>-v OUTSIDE:INSIDE</a:t>
             </a:r>
           </a:p>
         </p:txBody>
       </p:sp>
     </p:spTree>
-    <p:extLst>
-      <p:ext uri="{BB962C8B-B14F-4D97-AF65-F5344CB8AC3E}">
-        <p14:creationId xmlns:p14="http://schemas.microsoft.com/office/powerpoint/2010/main" val="317292931"/>
-      </p:ext>
-    </p:extLst>
   </p:cSld>
   <p:clrMapOvr>
     <a:masterClrMapping/>
@@ -12003,13 +11861,7 @@
       </p:grpSpPr>
       <p:sp>
         <p:nvSpPr>
-          <p:cNvPr id="4" name="Title 3">
-            <a:extLst>
-              <a:ext uri="{FF2B5EF4-FFF2-40B4-BE49-F238E27FC236}">
-                <a16:creationId xmlns:a16="http://schemas.microsoft.com/office/drawing/2014/main" id="{F07FED4D-9956-04AA-EF53-202B40E63091}"/>
-              </a:ext>
-            </a:extLst>
-          </p:cNvPr>
+          <p:cNvPr id="2" name="Title 1"/>
           <p:cNvSpPr>
             <a:spLocks noGrp="1"/>
           </p:cNvSpPr>
@@ -12019,84 +11871,174 @@
         </p:nvSpPr>
         <p:spPr/>
         <p:txBody>
-          <a:bodyPr/>
+          <a:bodyPr>
+            <a:normAutofit/>
+          </a:bodyPr>
           <a:lstStyle/>
           <a:p>
-            <a:r>
-              <a:rPr lang="en-US" dirty="0"/>
-              <a:t>Part 1: Container Essentials</a:t>
+            <a:pPr marL="0" lvl="0" indent="0">
+              <a:buNone/>
+            </a:pPr>
+            <a:r>
+              <a:rPr dirty="0"/>
+              <a:t>Introduction to Containers for Data Science </a:t>
+            </a:r>
+            <a:br>
+              <a:rPr lang="en-US" dirty="0"/>
+            </a:br>
+            <a:r>
+              <a:rPr lang="en-US" dirty="0"/>
+              <a:t>and</a:t>
+            </a:r>
+            <a:r>
+              <a:rPr dirty="0"/>
+              <a:t> Data Engineering</a:t>
             </a:r>
           </a:p>
         </p:txBody>
       </p:sp>
       <p:sp>
         <p:nvSpPr>
-          <p:cNvPr id="5" name="Text Placeholder 4">
-            <a:extLst>
-              <a:ext uri="{FF2B5EF4-FFF2-40B4-BE49-F238E27FC236}">
-                <a16:creationId xmlns:a16="http://schemas.microsoft.com/office/drawing/2014/main" id="{D8BC7140-CC0B-88E8-C22B-741CE93EE330}"/>
-              </a:ext>
-            </a:extLst>
-          </p:cNvPr>
+          <p:cNvPr id="3" name="Content Placeholder 2"/>
           <p:cNvSpPr>
             <a:spLocks noGrp="1"/>
           </p:cNvSpPr>
           <p:nvPr>
-            <p:ph type="body" idx="1"/>
+            <p:ph sz="quarter" idx="13"/>
           </p:nvPr>
         </p:nvSpPr>
-        <p:spPr/>
-        <p:txBody>
-          <a:bodyPr/>
-          <a:lstStyle/>
-          <a:p>
-            <a:r>
-              <a:rPr lang="en-US" dirty="0"/>
-              <a:t>Important concepts for understanding containers and docker</a:t>
-            </a:r>
-          </a:p>
-        </p:txBody>
-      </p:sp>
-      <p:pic>
-        <p:nvPicPr>
-          <p:cNvPr id="7" name="Graphic 6" descr="Box outline">
-            <a:extLst>
-              <a:ext uri="{FF2B5EF4-FFF2-40B4-BE49-F238E27FC236}">
-                <a16:creationId xmlns:a16="http://schemas.microsoft.com/office/drawing/2014/main" id="{C7564AFA-56F9-CF5C-3D8C-D47FF5C7D416}"/>
-              </a:ext>
-            </a:extLst>
-          </p:cNvPr>
-          <p:cNvPicPr>
-            <a:picLocks noChangeAspect="1"/>
-          </p:cNvPicPr>
-          <p:nvPr/>
-        </p:nvPicPr>
-        <p:blipFill>
-          <a:blip r:embed="rId2">
-            <a:extLst>
-              <a:ext uri="{96DAC541-7B7A-43D3-8B79-37D633B846F1}">
-                <asvg:svgBlip xmlns:asvg="http://schemas.microsoft.com/office/drawing/2016/SVG/main" r:embed="rId3"/>
-              </a:ext>
-            </a:extLst>
-          </a:blip>
-          <a:stretch>
-            <a:fillRect/>
-          </a:stretch>
-        </p:blipFill>
         <p:spPr>
           <a:xfrm>
-            <a:off x="6391834" y="831405"/>
-            <a:ext cx="1640542" cy="1640542"/>
+            <a:off x="4303776" y="507206"/>
+            <a:ext cx="4686634" cy="4448457"/>
           </a:xfrm>
-          <a:prstGeom prst="rect">
-            <a:avLst/>
-          </a:prstGeom>
         </p:spPr>
-      </p:pic>
+        <p:txBody>
+          <a:bodyPr>
+            <a:normAutofit fontScale="92500" lnSpcReduction="10000"/>
+          </a:bodyPr>
+          <a:lstStyle/>
+          <a:p>
+            <a:pPr marL="0" lvl="0" indent="0">
+              <a:buNone/>
+            </a:pPr>
+            <a:r>
+              <a:rPr sz="3200" dirty="0"/>
+              <a:t>Open Data Science Conference </a:t>
+            </a:r>
+            <a:r>
+              <a:rPr lang="en-US" sz="3200" dirty="0"/>
+              <a:t>West</a:t>
+            </a:r>
+            <a:r>
+              <a:rPr sz="3200" dirty="0"/>
+              <a:t> 2024</a:t>
+            </a:r>
+          </a:p>
+          <a:p>
+            <a:pPr marL="0" indent="0">
+              <a:buNone/>
+            </a:pPr>
+            <a:r>
+              <a:rPr lang="en-US" dirty="0">
+                <a:hlinkClick r:id="rId2"/>
+              </a:rPr>
+              <a:t>https://github.com/mafudge/odsc24</a:t>
+            </a:r>
+            <a:r>
+              <a:rPr lang="en-US" dirty="0"/>
+              <a:t> </a:t>
+            </a:r>
+          </a:p>
+          <a:p>
+            <a:pPr marL="0" indent="0">
+              <a:buNone/>
+            </a:pPr>
+            <a:br>
+              <a:rPr lang="en-US" sz="2000" dirty="0"/>
+            </a:br>
+            <a:r>
+              <a:rPr sz="3200" dirty="0"/>
+              <a:t>Michael Fudge</a:t>
+            </a:r>
+            <a:endParaRPr lang="en-US" sz="3200" dirty="0"/>
+          </a:p>
+          <a:p>
+            <a:pPr marL="0" indent="0">
+              <a:buNone/>
+            </a:pPr>
+            <a:r>
+              <a:rPr lang="en-US" dirty="0"/>
+              <a:t>Professor of Practice</a:t>
+            </a:r>
+            <a:br>
+              <a:rPr lang="en-US" dirty="0"/>
+            </a:br>
+            <a:r>
+              <a:rPr lang="en-US" dirty="0">
+                <a:hlinkClick r:id="rId3"/>
+              </a:rPr>
+              <a:t>mafudge@syr.edu</a:t>
+            </a:r>
+            <a:r>
+              <a:rPr lang="en-US" dirty="0"/>
+              <a:t> </a:t>
+            </a:r>
+            <a:br>
+              <a:rPr lang="en-US" dirty="0"/>
+            </a:br>
+            <a:endParaRPr lang="en-US" dirty="0"/>
+          </a:p>
+          <a:p>
+            <a:pPr marL="0" lvl="0" indent="0">
+              <a:buNone/>
+            </a:pPr>
+            <a:r>
+              <a:rPr lang="en-US" dirty="0"/>
+              <a:t>Syracuse University, iSchool</a:t>
+            </a:r>
+            <a:br>
+              <a:rPr lang="en-US" dirty="0"/>
+            </a:br>
+            <a:r>
+              <a:rPr lang="en-US" dirty="0">
+                <a:hlinkClick r:id="rId4"/>
+              </a:rPr>
+              <a:t>https://ischool.syr.edu</a:t>
+            </a:r>
+            <a:r>
+              <a:rPr lang="en-US" dirty="0"/>
+              <a:t> </a:t>
+            </a:r>
+          </a:p>
+          <a:p>
+            <a:pPr marL="0" lvl="0" indent="0">
+              <a:buNone/>
+            </a:pPr>
+            <a:r>
+              <a:rPr lang="en-US" dirty="0" err="1"/>
+              <a:t>Apphammer</a:t>
+            </a:r>
+            <a:endParaRPr lang="en-US" dirty="0"/>
+          </a:p>
+          <a:p>
+            <a:pPr marL="0" lvl="0" indent="0">
+              <a:buNone/>
+            </a:pPr>
+            <a:r>
+              <a:rPr lang="en-US" dirty="0">
+                <a:hlinkClick r:id="rId5"/>
+              </a:rPr>
+              <a:t>https://apphammer.co</a:t>
+            </a:r>
+            <a:endParaRPr lang="en-US" dirty="0"/>
+          </a:p>
+        </p:txBody>
+      </p:sp>
     </p:spTree>
     <p:extLst>
       <p:ext uri="{BB962C8B-B14F-4D97-AF65-F5344CB8AC3E}">
-        <p14:creationId xmlns:p14="http://schemas.microsoft.com/office/powerpoint/2010/main" val="3763426360"/>
+        <p14:creationId xmlns:p14="http://schemas.microsoft.com/office/powerpoint/2010/main" val="1931690552"/>
       </p:ext>
     </p:extLst>
   </p:cSld>
@@ -12107,6 +12049,142 @@
 </file>
 
 <file path=ppt/slides/slide20.xml><?xml version="1.0" encoding="utf-8"?>
+<p:sld xmlns:a="http://schemas.openxmlformats.org/drawingml/2006/main" xmlns:r="http://schemas.openxmlformats.org/officeDocument/2006/relationships" xmlns:p="http://schemas.openxmlformats.org/presentationml/2006/main">
+  <p:cSld>
+    <p:spTree>
+      <p:nvGrpSpPr>
+        <p:cNvPr id="1" name=""/>
+        <p:cNvGrpSpPr/>
+        <p:nvPr/>
+      </p:nvGrpSpPr>
+      <p:grpSpPr>
+        <a:xfrm>
+          <a:off x="0" y="0"/>
+          <a:ext cx="0" cy="0"/>
+          <a:chOff x="0" y="0"/>
+          <a:chExt cx="0" cy="0"/>
+        </a:xfrm>
+      </p:grpSpPr>
+      <p:sp>
+        <p:nvSpPr>
+          <p:cNvPr id="5" name="Content Placeholder 4">
+            <a:extLst>
+              <a:ext uri="{FF2B5EF4-FFF2-40B4-BE49-F238E27FC236}">
+                <a16:creationId xmlns:a16="http://schemas.microsoft.com/office/drawing/2014/main" id="{433261ED-928A-F607-5867-AD82700BDF1E}"/>
+              </a:ext>
+            </a:extLst>
+          </p:cNvPr>
+          <p:cNvSpPr>
+            <a:spLocks noGrp="1"/>
+          </p:cNvSpPr>
+          <p:nvPr>
+            <p:ph idx="1"/>
+          </p:nvPr>
+        </p:nvSpPr>
+        <p:spPr>
+          <a:xfrm>
+            <a:off x="2295939" y="1268016"/>
+            <a:ext cx="6492737" cy="3364707"/>
+          </a:xfrm>
+        </p:spPr>
+        <p:txBody>
+          <a:bodyPr/>
+          <a:lstStyle/>
+          <a:p>
+            <a:r>
+              <a:rPr lang="en-US" dirty="0"/>
+              <a:t>In the running container save a file.</a:t>
+            </a:r>
+          </a:p>
+          <a:p>
+            <a:r>
+              <a:rPr lang="en-US" dirty="0"/>
+              <a:t>Stop and remove the container</a:t>
+            </a:r>
+          </a:p>
+          <a:p>
+            <a:r>
+              <a:rPr lang="en-US" dirty="0"/>
+              <a:t>Re-run the container</a:t>
+            </a:r>
+          </a:p>
+          <a:p>
+            <a:r>
+              <a:rPr lang="en-US" dirty="0"/>
+              <a:t>Check back into the App… file is gone. Ephemeral.</a:t>
+            </a:r>
+          </a:p>
+          <a:p>
+            <a:r>
+              <a:rPr lang="en-US" dirty="0"/>
+              <a:t>Stop and remove the container… again</a:t>
+            </a:r>
+          </a:p>
+          <a:p>
+            <a:r>
+              <a:rPr lang="en-US" dirty="0"/>
+              <a:t>Check out that local work folder</a:t>
+            </a:r>
+          </a:p>
+          <a:p>
+            <a:r>
+              <a:rPr lang="en-US" dirty="0"/>
+              <a:t>Mount that folder as a container volume</a:t>
+            </a:r>
+          </a:p>
+          <a:p>
+            <a:r>
+              <a:rPr lang="en-US" dirty="0"/>
+              <a:t>Stop and remove the container… last time</a:t>
+            </a:r>
+          </a:p>
+          <a:p>
+            <a:endParaRPr lang="en-US" dirty="0"/>
+          </a:p>
+        </p:txBody>
+      </p:sp>
+      <p:sp>
+        <p:nvSpPr>
+          <p:cNvPr id="4" name="Title 3">
+            <a:extLst>
+              <a:ext uri="{FF2B5EF4-FFF2-40B4-BE49-F238E27FC236}">
+                <a16:creationId xmlns:a16="http://schemas.microsoft.com/office/drawing/2014/main" id="{81476FC7-4678-4EE6-A902-ACE370E6715F}"/>
+              </a:ext>
+            </a:extLst>
+          </p:cNvPr>
+          <p:cNvSpPr>
+            <a:spLocks noGrp="1"/>
+          </p:cNvSpPr>
+          <p:nvPr>
+            <p:ph type="title"/>
+          </p:nvPr>
+        </p:nvSpPr>
+        <p:spPr/>
+        <p:txBody>
+          <a:bodyPr/>
+          <a:lstStyle/>
+          <a:p>
+            <a:r>
+              <a:rPr lang="en-US" dirty="0"/>
+              <a:t>Demo 4: Volumes</a:t>
+            </a:r>
+          </a:p>
+        </p:txBody>
+      </p:sp>
+    </p:spTree>
+    <p:extLst>
+      <p:ext uri="{BB962C8B-B14F-4D97-AF65-F5344CB8AC3E}">
+        <p14:creationId xmlns:p14="http://schemas.microsoft.com/office/powerpoint/2010/main" val="317292931"/>
+      </p:ext>
+    </p:extLst>
+  </p:cSld>
+  <p:clrMapOvr>
+    <a:masterClrMapping/>
+  </p:clrMapOvr>
+</p:sld>
+</file>
+
+<file path=ppt/slides/slide21.xml><?xml version="1.0" encoding="utf-8"?>
 <p:sld xmlns:a="http://schemas.openxmlformats.org/drawingml/2006/main" xmlns:r="http://schemas.openxmlformats.org/officeDocument/2006/relationships" xmlns:p="http://schemas.openxmlformats.org/presentationml/2006/main">
   <p:cSld>
     <p:spTree>
@@ -12577,7 +12655,7 @@
 </p:sld>
 </file>
 
-<file path=ppt/slides/slide21.xml><?xml version="1.0" encoding="utf-8"?>
+<file path=ppt/slides/slide22.xml><?xml version="1.0" encoding="utf-8"?>
 <p:sld xmlns:a="http://schemas.openxmlformats.org/drawingml/2006/main" xmlns:r="http://schemas.openxmlformats.org/officeDocument/2006/relationships" xmlns:p="http://schemas.openxmlformats.org/presentationml/2006/main">
   <p:cSld>
     <p:spTree>
@@ -12692,7 +12770,7 @@
 </p:sld>
 </file>
 
-<file path=ppt/slides/slide22.xml><?xml version="1.0" encoding="utf-8"?>
+<file path=ppt/slides/slide23.xml><?xml version="1.0" encoding="utf-8"?>
 <p:sld xmlns:a="http://schemas.openxmlformats.org/drawingml/2006/main" xmlns:r="http://schemas.openxmlformats.org/officeDocument/2006/relationships" xmlns:p="http://schemas.openxmlformats.org/presentationml/2006/main">
   <p:cSld>
     <p:spTree>
@@ -13731,7 +13809,7 @@
 </p:sld>
 </file>
 
-<file path=ppt/slides/slide23.xml><?xml version="1.0" encoding="utf-8"?>
+<file path=ppt/slides/slide24.xml><?xml version="1.0" encoding="utf-8"?>
 <p:sld xmlns:a="http://schemas.openxmlformats.org/drawingml/2006/main" xmlns:r="http://schemas.openxmlformats.org/officeDocument/2006/relationships" xmlns:p="http://schemas.openxmlformats.org/presentationml/2006/main">
   <p:cSld>
     <p:spTree>
@@ -13837,7 +13915,7 @@
 </p:sld>
 </file>
 
-<file path=ppt/slides/slide24.xml><?xml version="1.0" encoding="utf-8"?>
+<file path=ppt/slides/slide25.xml><?xml version="1.0" encoding="utf-8"?>
 <p:sld xmlns:a="http://schemas.openxmlformats.org/drawingml/2006/main" xmlns:r="http://schemas.openxmlformats.org/officeDocument/2006/relationships" xmlns:p="http://schemas.openxmlformats.org/presentationml/2006/main">
   <p:cSld>
     <p:spTree>
@@ -14402,7 +14480,7 @@
 </p:sld>
 </file>
 
-<file path=ppt/slides/slide25.xml><?xml version="1.0" encoding="utf-8"?>
+<file path=ppt/slides/slide26.xml><?xml version="1.0" encoding="utf-8"?>
 <p:sld xmlns:a="http://schemas.openxmlformats.org/drawingml/2006/main" xmlns:r="http://schemas.openxmlformats.org/officeDocument/2006/relationships" xmlns:p="http://schemas.openxmlformats.org/presentationml/2006/main">
   <p:cSld>
     <p:spTree>
@@ -14524,7 +14602,7 @@
 </p:sld>
 </file>
 
-<file path=ppt/slides/slide26.xml><?xml version="1.0" encoding="utf-8"?>
+<file path=ppt/slides/slide27.xml><?xml version="1.0" encoding="utf-8"?>
 <p:sld xmlns:a="http://schemas.openxmlformats.org/drawingml/2006/main" xmlns:r="http://schemas.openxmlformats.org/officeDocument/2006/relationships" xmlns:p="http://schemas.openxmlformats.org/presentationml/2006/main">
   <p:cSld>
     <p:spTree>
@@ -14917,220 +14995,6 @@
 </p:sld>
 </file>
 
-<file path=ppt/slides/slide27.xml><?xml version="1.0" encoding="utf-8"?>
-<p:sld xmlns:a="http://schemas.openxmlformats.org/drawingml/2006/main" xmlns:r="http://schemas.openxmlformats.org/officeDocument/2006/relationships" xmlns:p="http://schemas.openxmlformats.org/presentationml/2006/main">
-  <p:cSld>
-    <p:spTree>
-      <p:nvGrpSpPr>
-        <p:cNvPr id="1" name=""/>
-        <p:cNvGrpSpPr/>
-        <p:nvPr/>
-      </p:nvGrpSpPr>
-      <p:grpSpPr>
-        <a:xfrm>
-          <a:off x="0" y="0"/>
-          <a:ext cx="0" cy="0"/>
-          <a:chOff x="0" y="0"/>
-          <a:chExt cx="0" cy="0"/>
-        </a:xfrm>
-      </p:grpSpPr>
-      <p:sp>
-        <p:nvSpPr>
-          <p:cNvPr id="2" name="Title 1"/>
-          <p:cNvSpPr>
-            <a:spLocks noGrp="1"/>
-          </p:cNvSpPr>
-          <p:nvPr>
-            <p:ph type="title"/>
-          </p:nvPr>
-        </p:nvSpPr>
-        <p:spPr/>
-        <p:txBody>
-          <a:bodyPr/>
-          <a:lstStyle/>
-          <a:p>
-            <a:pPr marL="0" lvl="0" indent="0">
-              <a:buNone/>
-            </a:pPr>
-            <a:r>
-              <a:rPr lang="en-US" dirty="0" err="1"/>
-              <a:t>Dockerfile</a:t>
-            </a:r>
-            <a:r>
-              <a:rPr lang="en-US" dirty="0"/>
-              <a:t>: </a:t>
-            </a:r>
-            <a:r>
-              <a:rPr dirty="0"/>
-              <a:t>Building your own image</a:t>
-            </a:r>
-          </a:p>
-        </p:txBody>
-      </p:sp>
-      <p:sp>
-        <p:nvSpPr>
-          <p:cNvPr id="3" name="Content Placeholder 2"/>
-          <p:cNvSpPr>
-            <a:spLocks noGrp="1"/>
-          </p:cNvSpPr>
-          <p:nvPr>
-            <p:ph idx="1"/>
-          </p:nvPr>
-        </p:nvSpPr>
-        <p:spPr/>
-        <p:txBody>
-          <a:bodyPr/>
-          <a:lstStyle/>
-          <a:p>
-            <a:pPr lvl="0"/>
-            <a:r>
-              <a:rPr dirty="0" err="1">
-                <a:solidFill>
-                  <a:schemeClr val="bg2">
-                    <a:lumMod val="50000"/>
-                  </a:schemeClr>
-                </a:solidFill>
-                <a:latin typeface="Consolas" panose="020B0609020204030204" pitchFamily="49" charset="0"/>
-              </a:rPr>
-              <a:t>Dockerfile</a:t>
-            </a:r>
-            <a:r>
-              <a:rPr dirty="0"/>
-              <a:t> explains how to build an image</a:t>
-            </a:r>
-          </a:p>
-          <a:p>
-            <a:pPr lvl="0"/>
-            <a:r>
-              <a:rPr dirty="0">
-                <a:solidFill>
-                  <a:schemeClr val="bg2">
-                    <a:lumMod val="50000"/>
-                  </a:schemeClr>
-                </a:solidFill>
-                <a:latin typeface="Consolas" panose="020B0609020204030204" pitchFamily="49" charset="0"/>
-              </a:rPr>
-              <a:t>FROM</a:t>
-            </a:r>
-            <a:r>
-              <a:rPr dirty="0"/>
-              <a:t> is the base image</a:t>
-            </a:r>
-            <a:r>
-              <a:rPr lang="en-US" dirty="0"/>
-              <a:t> from a public image repository</a:t>
-            </a:r>
-            <a:endParaRPr dirty="0"/>
-          </a:p>
-          <a:p>
-            <a:pPr lvl="0"/>
-            <a:r>
-              <a:rPr dirty="0">
-                <a:solidFill>
-                  <a:schemeClr val="bg2">
-                    <a:lumMod val="50000"/>
-                  </a:schemeClr>
-                </a:solidFill>
-                <a:latin typeface="Consolas" panose="020B0609020204030204" pitchFamily="49" charset="0"/>
-              </a:rPr>
-              <a:t>COPY</a:t>
-            </a:r>
-            <a:r>
-              <a:rPr dirty="0"/>
-              <a:t> copies files into the image</a:t>
-            </a:r>
-          </a:p>
-          <a:p>
-            <a:pPr lvl="0"/>
-            <a:r>
-              <a:rPr dirty="0">
-                <a:solidFill>
-                  <a:schemeClr val="bg2">
-                    <a:lumMod val="50000"/>
-                  </a:schemeClr>
-                </a:solidFill>
-                <a:latin typeface="Consolas" panose="020B0609020204030204" pitchFamily="49" charset="0"/>
-              </a:rPr>
-              <a:t>RUN</a:t>
-            </a:r>
-            <a:r>
-              <a:rPr dirty="0"/>
-              <a:t> executes a command in the image</a:t>
-            </a:r>
-          </a:p>
-          <a:p>
-            <a:pPr lvl="0"/>
-            <a:r>
-              <a:rPr dirty="0">
-                <a:solidFill>
-                  <a:schemeClr val="bg2">
-                    <a:lumMod val="50000"/>
-                  </a:schemeClr>
-                </a:solidFill>
-                <a:latin typeface="Consolas" panose="020B0609020204030204" pitchFamily="49" charset="0"/>
-              </a:rPr>
-              <a:t>ENTRYPOINT</a:t>
-            </a:r>
-            <a:r>
-              <a:rPr dirty="0"/>
-              <a:t> defines the default command from </a:t>
-            </a:r>
-            <a:r>
-              <a:rPr dirty="0">
-                <a:solidFill>
-                  <a:schemeClr val="bg2">
-                    <a:lumMod val="50000"/>
-                  </a:schemeClr>
-                </a:solidFill>
-                <a:latin typeface="Consolas" panose="020B0609020204030204" pitchFamily="49" charset="0"/>
-              </a:rPr>
-              <a:t>docker run</a:t>
-            </a:r>
-            <a:r>
-              <a:rPr lang="en-US" dirty="0">
-                <a:solidFill>
-                  <a:schemeClr val="bg2">
-                    <a:lumMod val="50000"/>
-                  </a:schemeClr>
-                </a:solidFill>
-                <a:latin typeface="Consolas" panose="020B0609020204030204" pitchFamily="49" charset="0"/>
-              </a:rPr>
-              <a:t> </a:t>
-            </a:r>
-            <a:r>
-              <a:rPr lang="en-US" dirty="0"/>
-              <a:t>or </a:t>
-            </a:r>
-            <a:r>
-              <a:rPr lang="en-US" dirty="0">
-                <a:solidFill>
-                  <a:schemeClr val="bg2">
-                    <a:lumMod val="50000"/>
-                  </a:schemeClr>
-                </a:solidFill>
-                <a:latin typeface="Consolas" panose="020B0609020204030204" pitchFamily="49" charset="0"/>
-              </a:rPr>
-              <a:t>docker compose up</a:t>
-            </a:r>
-            <a:endParaRPr dirty="0">
-              <a:solidFill>
-                <a:schemeClr val="bg2">
-                  <a:lumMod val="50000"/>
-                </a:schemeClr>
-              </a:solidFill>
-              <a:latin typeface="Consolas" panose="020B0609020204030204" pitchFamily="49" charset="0"/>
-            </a:endParaRPr>
-          </a:p>
-        </p:txBody>
-      </p:sp>
-    </p:spTree>
-  </p:cSld>
-  <p:clrMapOvr>
-    <a:masterClrMapping/>
-  </p:clrMapOvr>
-</p:sld>
-</file>
-
 <file path=ppt/slides/slide28.xml><?xml version="1.0" encoding="utf-8"?>
 <p:sld xmlns:a="http://schemas.openxmlformats.org/drawingml/2006/main" xmlns:r="http://schemas.openxmlformats.org/officeDocument/2006/relationships" xmlns:p="http://schemas.openxmlformats.org/presentationml/2006/main">
   <p:cSld>
@@ -15150,6 +15014,220 @@
       </p:grpSpPr>
       <p:sp>
         <p:nvSpPr>
+          <p:cNvPr id="2" name="Title 1"/>
+          <p:cNvSpPr>
+            <a:spLocks noGrp="1"/>
+          </p:cNvSpPr>
+          <p:nvPr>
+            <p:ph type="title"/>
+          </p:nvPr>
+        </p:nvSpPr>
+        <p:spPr/>
+        <p:txBody>
+          <a:bodyPr/>
+          <a:lstStyle/>
+          <a:p>
+            <a:pPr marL="0" lvl="0" indent="0">
+              <a:buNone/>
+            </a:pPr>
+            <a:r>
+              <a:rPr lang="en-US" dirty="0" err="1"/>
+              <a:t>Dockerfile</a:t>
+            </a:r>
+            <a:r>
+              <a:rPr lang="en-US" dirty="0"/>
+              <a:t>: </a:t>
+            </a:r>
+            <a:r>
+              <a:rPr dirty="0"/>
+              <a:t>Building your own image</a:t>
+            </a:r>
+          </a:p>
+        </p:txBody>
+      </p:sp>
+      <p:sp>
+        <p:nvSpPr>
+          <p:cNvPr id="3" name="Content Placeholder 2"/>
+          <p:cNvSpPr>
+            <a:spLocks noGrp="1"/>
+          </p:cNvSpPr>
+          <p:nvPr>
+            <p:ph idx="1"/>
+          </p:nvPr>
+        </p:nvSpPr>
+        <p:spPr/>
+        <p:txBody>
+          <a:bodyPr/>
+          <a:lstStyle/>
+          <a:p>
+            <a:pPr lvl="0"/>
+            <a:r>
+              <a:rPr dirty="0" err="1">
+                <a:solidFill>
+                  <a:schemeClr val="bg2">
+                    <a:lumMod val="50000"/>
+                  </a:schemeClr>
+                </a:solidFill>
+                <a:latin typeface="Consolas" panose="020B0609020204030204" pitchFamily="49" charset="0"/>
+              </a:rPr>
+              <a:t>Dockerfile</a:t>
+            </a:r>
+            <a:r>
+              <a:rPr dirty="0"/>
+              <a:t> explains how to build an image</a:t>
+            </a:r>
+          </a:p>
+          <a:p>
+            <a:pPr lvl="0"/>
+            <a:r>
+              <a:rPr dirty="0">
+                <a:solidFill>
+                  <a:schemeClr val="bg2">
+                    <a:lumMod val="50000"/>
+                  </a:schemeClr>
+                </a:solidFill>
+                <a:latin typeface="Consolas" panose="020B0609020204030204" pitchFamily="49" charset="0"/>
+              </a:rPr>
+              <a:t>FROM</a:t>
+            </a:r>
+            <a:r>
+              <a:rPr dirty="0"/>
+              <a:t> is the base image</a:t>
+            </a:r>
+            <a:r>
+              <a:rPr lang="en-US" dirty="0"/>
+              <a:t> from a public image repository</a:t>
+            </a:r>
+            <a:endParaRPr dirty="0"/>
+          </a:p>
+          <a:p>
+            <a:pPr lvl="0"/>
+            <a:r>
+              <a:rPr dirty="0">
+                <a:solidFill>
+                  <a:schemeClr val="bg2">
+                    <a:lumMod val="50000"/>
+                  </a:schemeClr>
+                </a:solidFill>
+                <a:latin typeface="Consolas" panose="020B0609020204030204" pitchFamily="49" charset="0"/>
+              </a:rPr>
+              <a:t>COPY</a:t>
+            </a:r>
+            <a:r>
+              <a:rPr dirty="0"/>
+              <a:t> copies files into the image</a:t>
+            </a:r>
+          </a:p>
+          <a:p>
+            <a:pPr lvl="0"/>
+            <a:r>
+              <a:rPr dirty="0">
+                <a:solidFill>
+                  <a:schemeClr val="bg2">
+                    <a:lumMod val="50000"/>
+                  </a:schemeClr>
+                </a:solidFill>
+                <a:latin typeface="Consolas" panose="020B0609020204030204" pitchFamily="49" charset="0"/>
+              </a:rPr>
+              <a:t>RUN</a:t>
+            </a:r>
+            <a:r>
+              <a:rPr dirty="0"/>
+              <a:t> executes a command in the image</a:t>
+            </a:r>
+          </a:p>
+          <a:p>
+            <a:pPr lvl="0"/>
+            <a:r>
+              <a:rPr dirty="0">
+                <a:solidFill>
+                  <a:schemeClr val="bg2">
+                    <a:lumMod val="50000"/>
+                  </a:schemeClr>
+                </a:solidFill>
+                <a:latin typeface="Consolas" panose="020B0609020204030204" pitchFamily="49" charset="0"/>
+              </a:rPr>
+              <a:t>ENTRYPOINT</a:t>
+            </a:r>
+            <a:r>
+              <a:rPr dirty="0"/>
+              <a:t> defines the default command from </a:t>
+            </a:r>
+            <a:r>
+              <a:rPr dirty="0">
+                <a:solidFill>
+                  <a:schemeClr val="bg2">
+                    <a:lumMod val="50000"/>
+                  </a:schemeClr>
+                </a:solidFill>
+                <a:latin typeface="Consolas" panose="020B0609020204030204" pitchFamily="49" charset="0"/>
+              </a:rPr>
+              <a:t>docker run</a:t>
+            </a:r>
+            <a:r>
+              <a:rPr lang="en-US" dirty="0">
+                <a:solidFill>
+                  <a:schemeClr val="bg2">
+                    <a:lumMod val="50000"/>
+                  </a:schemeClr>
+                </a:solidFill>
+                <a:latin typeface="Consolas" panose="020B0609020204030204" pitchFamily="49" charset="0"/>
+              </a:rPr>
+              <a:t> </a:t>
+            </a:r>
+            <a:r>
+              <a:rPr lang="en-US" dirty="0"/>
+              <a:t>or </a:t>
+            </a:r>
+            <a:r>
+              <a:rPr lang="en-US" dirty="0">
+                <a:solidFill>
+                  <a:schemeClr val="bg2">
+                    <a:lumMod val="50000"/>
+                  </a:schemeClr>
+                </a:solidFill>
+                <a:latin typeface="Consolas" panose="020B0609020204030204" pitchFamily="49" charset="0"/>
+              </a:rPr>
+              <a:t>docker compose up</a:t>
+            </a:r>
+            <a:endParaRPr dirty="0">
+              <a:solidFill>
+                <a:schemeClr val="bg2">
+                  <a:lumMod val="50000"/>
+                </a:schemeClr>
+              </a:solidFill>
+              <a:latin typeface="Consolas" panose="020B0609020204030204" pitchFamily="49" charset="0"/>
+            </a:endParaRPr>
+          </a:p>
+        </p:txBody>
+      </p:sp>
+    </p:spTree>
+  </p:cSld>
+  <p:clrMapOvr>
+    <a:masterClrMapping/>
+  </p:clrMapOvr>
+</p:sld>
+</file>
+
+<file path=ppt/slides/slide29.xml><?xml version="1.0" encoding="utf-8"?>
+<p:sld xmlns:a="http://schemas.openxmlformats.org/drawingml/2006/main" xmlns:r="http://schemas.openxmlformats.org/officeDocument/2006/relationships" xmlns:p="http://schemas.openxmlformats.org/presentationml/2006/main">
+  <p:cSld>
+    <p:spTree>
+      <p:nvGrpSpPr>
+        <p:cNvPr id="1" name=""/>
+        <p:cNvGrpSpPr/>
+        <p:nvPr/>
+      </p:nvGrpSpPr>
+      <p:grpSpPr>
+        <a:xfrm>
+          <a:off x="0" y="0"/>
+          <a:ext cx="0" cy="0"/>
+          <a:chOff x="0" y="0"/>
+          <a:chExt cx="0" cy="0"/>
+        </a:xfrm>
+      </p:grpSpPr>
+      <p:sp>
+        <p:nvSpPr>
           <p:cNvPr id="5" name="Content Placeholder 4">
             <a:extLst>
               <a:ext uri="{FF2B5EF4-FFF2-40B4-BE49-F238E27FC236}">
@@ -15330,7 +15408,129 @@
 </p:sld>
 </file>
 
-<file path=ppt/slides/slide29.xml><?xml version="1.0" encoding="utf-8"?>
+<file path=ppt/slides/slide3.xml><?xml version="1.0" encoding="utf-8"?>
+<p:sld xmlns:a="http://schemas.openxmlformats.org/drawingml/2006/main" xmlns:r="http://schemas.openxmlformats.org/officeDocument/2006/relationships" xmlns:p="http://schemas.openxmlformats.org/presentationml/2006/main">
+  <p:cSld>
+    <p:spTree>
+      <p:nvGrpSpPr>
+        <p:cNvPr id="1" name=""/>
+        <p:cNvGrpSpPr/>
+        <p:nvPr/>
+      </p:nvGrpSpPr>
+      <p:grpSpPr>
+        <a:xfrm>
+          <a:off x="0" y="0"/>
+          <a:ext cx="0" cy="0"/>
+          <a:chOff x="0" y="0"/>
+          <a:chExt cx="0" cy="0"/>
+        </a:xfrm>
+      </p:grpSpPr>
+      <p:sp>
+        <p:nvSpPr>
+          <p:cNvPr id="4" name="Title 3">
+            <a:extLst>
+              <a:ext uri="{FF2B5EF4-FFF2-40B4-BE49-F238E27FC236}">
+                <a16:creationId xmlns:a16="http://schemas.microsoft.com/office/drawing/2014/main" id="{F07FED4D-9956-04AA-EF53-202B40E63091}"/>
+              </a:ext>
+            </a:extLst>
+          </p:cNvPr>
+          <p:cNvSpPr>
+            <a:spLocks noGrp="1"/>
+          </p:cNvSpPr>
+          <p:nvPr>
+            <p:ph type="title"/>
+          </p:nvPr>
+        </p:nvSpPr>
+        <p:spPr/>
+        <p:txBody>
+          <a:bodyPr/>
+          <a:lstStyle/>
+          <a:p>
+            <a:r>
+              <a:rPr lang="en-US" dirty="0"/>
+              <a:t>Part 1: Container Essentials</a:t>
+            </a:r>
+          </a:p>
+        </p:txBody>
+      </p:sp>
+      <p:sp>
+        <p:nvSpPr>
+          <p:cNvPr id="5" name="Text Placeholder 4">
+            <a:extLst>
+              <a:ext uri="{FF2B5EF4-FFF2-40B4-BE49-F238E27FC236}">
+                <a16:creationId xmlns:a16="http://schemas.microsoft.com/office/drawing/2014/main" id="{D8BC7140-CC0B-88E8-C22B-741CE93EE330}"/>
+              </a:ext>
+            </a:extLst>
+          </p:cNvPr>
+          <p:cNvSpPr>
+            <a:spLocks noGrp="1"/>
+          </p:cNvSpPr>
+          <p:nvPr>
+            <p:ph type="body" idx="1"/>
+          </p:nvPr>
+        </p:nvSpPr>
+        <p:spPr/>
+        <p:txBody>
+          <a:bodyPr/>
+          <a:lstStyle/>
+          <a:p>
+            <a:r>
+              <a:rPr lang="en-US" dirty="0"/>
+              <a:t>Important concepts for understanding containers and docker</a:t>
+            </a:r>
+          </a:p>
+        </p:txBody>
+      </p:sp>
+      <p:pic>
+        <p:nvPicPr>
+          <p:cNvPr id="7" name="Graphic 6" descr="Box outline">
+            <a:extLst>
+              <a:ext uri="{FF2B5EF4-FFF2-40B4-BE49-F238E27FC236}">
+                <a16:creationId xmlns:a16="http://schemas.microsoft.com/office/drawing/2014/main" id="{C7564AFA-56F9-CF5C-3D8C-D47FF5C7D416}"/>
+              </a:ext>
+            </a:extLst>
+          </p:cNvPr>
+          <p:cNvPicPr>
+            <a:picLocks noChangeAspect="1"/>
+          </p:cNvPicPr>
+          <p:nvPr/>
+        </p:nvPicPr>
+        <p:blipFill>
+          <a:blip r:embed="rId2">
+            <a:extLst>
+              <a:ext uri="{96DAC541-7B7A-43D3-8B79-37D633B846F1}">
+                <asvg:svgBlip xmlns:asvg="http://schemas.microsoft.com/office/drawing/2016/SVG/main" r:embed="rId3"/>
+              </a:ext>
+            </a:extLst>
+          </a:blip>
+          <a:stretch>
+            <a:fillRect/>
+          </a:stretch>
+        </p:blipFill>
+        <p:spPr>
+          <a:xfrm>
+            <a:off x="6391834" y="831405"/>
+            <a:ext cx="1640542" cy="1640542"/>
+          </a:xfrm>
+          <a:prstGeom prst="rect">
+            <a:avLst/>
+          </a:prstGeom>
+        </p:spPr>
+      </p:pic>
+    </p:spTree>
+    <p:extLst>
+      <p:ext uri="{BB962C8B-B14F-4D97-AF65-F5344CB8AC3E}">
+        <p14:creationId xmlns:p14="http://schemas.microsoft.com/office/powerpoint/2010/main" val="3763426360"/>
+      </p:ext>
+    </p:extLst>
+  </p:cSld>
+  <p:clrMapOvr>
+    <a:masterClrMapping/>
+  </p:clrMapOvr>
+</p:sld>
+</file>
+
+<file path=ppt/slides/slide30.xml><?xml version="1.0" encoding="utf-8"?>
 <p:sld xmlns:a="http://schemas.openxmlformats.org/drawingml/2006/main" xmlns:r="http://schemas.openxmlformats.org/officeDocument/2006/relationships" xmlns:p="http://schemas.openxmlformats.org/presentationml/2006/main">
   <p:cSld>
     <p:spTree>
@@ -16095,311 +16295,6 @@
 </p:sld>
 </file>
 
-<file path=ppt/slides/slide3.xml><?xml version="1.0" encoding="utf-8"?>
-<p:sld xmlns:a="http://schemas.openxmlformats.org/drawingml/2006/main" xmlns:r="http://schemas.openxmlformats.org/officeDocument/2006/relationships" xmlns:p="http://schemas.openxmlformats.org/presentationml/2006/main">
-  <p:cSld>
-    <p:spTree>
-      <p:nvGrpSpPr>
-        <p:cNvPr id="1" name=""/>
-        <p:cNvGrpSpPr/>
-        <p:nvPr/>
-      </p:nvGrpSpPr>
-      <p:grpSpPr>
-        <a:xfrm>
-          <a:off x="0" y="0"/>
-          <a:ext cx="0" cy="0"/>
-          <a:chOff x="0" y="0"/>
-          <a:chExt cx="0" cy="0"/>
-        </a:xfrm>
-      </p:grpSpPr>
-      <p:sp>
-        <p:nvSpPr>
-          <p:cNvPr id="2" name="Title 1"/>
-          <p:cNvSpPr>
-            <a:spLocks noGrp="1"/>
-          </p:cNvSpPr>
-          <p:nvPr>
-            <p:ph type="title"/>
-          </p:nvPr>
-        </p:nvSpPr>
-        <p:spPr/>
-        <p:txBody>
-          <a:bodyPr/>
-          <a:lstStyle/>
-          <a:p>
-            <a:pPr marL="0" lvl="0" indent="0">
-              <a:buNone/>
-            </a:pPr>
-            <a:r>
-              <a:t>Rationale</a:t>
-            </a:r>
-          </a:p>
-        </p:txBody>
-      </p:sp>
-      <p:sp>
-        <p:nvSpPr>
-          <p:cNvPr id="3" name="Content Placeholder 2"/>
-          <p:cNvSpPr>
-            <a:spLocks noGrp="1"/>
-          </p:cNvSpPr>
-          <p:nvPr>
-            <p:ph idx="1"/>
-          </p:nvPr>
-        </p:nvSpPr>
-        <p:spPr/>
-        <p:txBody>
-          <a:bodyPr/>
-          <a:lstStyle/>
-          <a:p>
-            <a:pPr marL="0" lvl="0" indent="0">
-              <a:buNone/>
-            </a:pPr>
-            <a:r>
-              <a:rPr dirty="0"/>
-              <a:t>Have you ever:</a:t>
-            </a:r>
-          </a:p>
-          <a:p>
-            <a:pPr lvl="0"/>
-            <a:r>
-              <a:rPr dirty="0"/>
-              <a:t>Worked on a project on more than one computer?</a:t>
-            </a:r>
-          </a:p>
-          <a:p>
-            <a:pPr lvl="0"/>
-            <a:r>
-              <a:rPr dirty="0"/>
-              <a:t>Shared a project with a team?</a:t>
-            </a:r>
-          </a:p>
-          <a:p>
-            <a:pPr lvl="0"/>
-            <a:r>
-              <a:rPr lang="en-US" dirty="0"/>
-              <a:t>Said this</a:t>
-            </a:r>
-            <a:r>
-              <a:rPr dirty="0"/>
-              <a:t>: “but it works on my machine…”</a:t>
-            </a:r>
-          </a:p>
-          <a:p>
-            <a:pPr lvl="0"/>
-            <a:r>
-              <a:rPr dirty="0"/>
-              <a:t>Spent hours trying to deploy your project live?</a:t>
-            </a:r>
-          </a:p>
-          <a:p>
-            <a:pPr lvl="0"/>
-            <a:r>
-              <a:rPr dirty="0"/>
-              <a:t>If so, then containers are for YOU!</a:t>
-            </a:r>
-          </a:p>
-        </p:txBody>
-      </p:sp>
-    </p:spTree>
-  </p:cSld>
-  <p:clrMapOvr>
-    <a:masterClrMapping/>
-  </p:clrMapOvr>
-</p:sld>
-</file>
-
-<file path=ppt/slides/slide30.xml><?xml version="1.0" encoding="utf-8"?>
-<p:sld xmlns:a="http://schemas.openxmlformats.org/drawingml/2006/main" xmlns:r="http://schemas.openxmlformats.org/officeDocument/2006/relationships" xmlns:p="http://schemas.openxmlformats.org/presentationml/2006/main">
-  <p:cSld>
-    <p:spTree>
-      <p:nvGrpSpPr>
-        <p:cNvPr id="1" name=""/>
-        <p:cNvGrpSpPr/>
-        <p:nvPr/>
-      </p:nvGrpSpPr>
-      <p:grpSpPr>
-        <a:xfrm>
-          <a:off x="0" y="0"/>
-          <a:ext cx="0" cy="0"/>
-          <a:chOff x="0" y="0"/>
-          <a:chExt cx="0" cy="0"/>
-        </a:xfrm>
-      </p:grpSpPr>
-      <p:sp>
-        <p:nvSpPr>
-          <p:cNvPr id="2" name="Title 1"/>
-          <p:cNvSpPr>
-            <a:spLocks noGrp="1"/>
-          </p:cNvSpPr>
-          <p:nvPr>
-            <p:ph type="title"/>
-          </p:nvPr>
-        </p:nvSpPr>
-        <p:spPr/>
-        <p:txBody>
-          <a:bodyPr/>
-          <a:lstStyle/>
-          <a:p>
-            <a:pPr marL="0" lvl="0" indent="0">
-              <a:buNone/>
-            </a:pPr>
-            <a:r>
-              <a:rPr dirty="0"/>
-              <a:t>Useful, </a:t>
-            </a:r>
-            <a:r>
-              <a:rPr lang="en-US" dirty="0"/>
-              <a:t>but </a:t>
-            </a:r>
-            <a:r>
-              <a:rPr dirty="0"/>
-              <a:t>not Realistic</a:t>
-            </a:r>
-            <a:r>
-              <a:rPr lang="en-US" dirty="0"/>
-              <a:t>: Enter Dev Containers</a:t>
-            </a:r>
-            <a:endParaRPr dirty="0"/>
-          </a:p>
-        </p:txBody>
-      </p:sp>
-      <p:sp>
-        <p:nvSpPr>
-          <p:cNvPr id="3" name="Content Placeholder 2"/>
-          <p:cNvSpPr>
-            <a:spLocks noGrp="1"/>
-          </p:cNvSpPr>
-          <p:nvPr>
-            <p:ph idx="1"/>
-          </p:nvPr>
-        </p:nvSpPr>
-        <p:spPr>
-          <a:xfrm>
-            <a:off x="628650" y="1268018"/>
-            <a:ext cx="7886700" cy="3365609"/>
-          </a:xfrm>
-        </p:spPr>
-        <p:txBody>
-          <a:bodyPr/>
-          <a:lstStyle/>
-          <a:p>
-            <a:pPr lvl="0"/>
-            <a:r>
-              <a:rPr dirty="0"/>
-              <a:t>This is a useful way to run your</a:t>
-            </a:r>
-            <a:r>
-              <a:rPr lang="en-US" dirty="0"/>
-              <a:t> working</a:t>
-            </a:r>
-            <a:r>
-              <a:rPr dirty="0"/>
-              <a:t> programs</a:t>
-            </a:r>
-          </a:p>
-          <a:p>
-            <a:pPr lvl="0"/>
-            <a:r>
-              <a:rPr lang="en-US" dirty="0"/>
-              <a:t>It is impracticable to implement a dev-loop this way:</a:t>
-            </a:r>
-            <a:br>
-              <a:rPr lang="en-US" dirty="0"/>
-            </a:br>
-            <a:r>
-              <a:rPr dirty="0"/>
-              <a:t>write</a:t>
-            </a:r>
-            <a:r>
-              <a:rPr lang="en-US" dirty="0">
-                <a:sym typeface="Wingdings" panose="05000000000000000000" pitchFamily="2" charset="2"/>
-              </a:rPr>
-              <a:t> </a:t>
-            </a:r>
-            <a:r>
-              <a:rPr dirty="0"/>
-              <a:t>run</a:t>
-            </a:r>
-            <a:r>
-              <a:rPr lang="en-US" dirty="0">
-                <a:sym typeface="Wingdings" panose="05000000000000000000" pitchFamily="2" charset="2"/>
-              </a:rPr>
-              <a:t> </a:t>
-            </a:r>
-            <a:r>
-              <a:rPr dirty="0"/>
-              <a:t>debu</a:t>
-            </a:r>
-            <a:r>
-              <a:rPr lang="en-US" dirty="0"/>
-              <a:t>g…</a:t>
-            </a:r>
-            <a:endParaRPr dirty="0"/>
-          </a:p>
-          <a:p>
-            <a:pPr lvl="0"/>
-            <a:r>
-              <a:rPr dirty="0"/>
-              <a:t>Enter the Visual Studio Code dev containers!</a:t>
-            </a:r>
-            <a:endParaRPr lang="en-US" dirty="0"/>
-          </a:p>
-          <a:p>
-            <a:r>
-              <a:rPr lang="en-US" dirty="0" err="1">
-                <a:solidFill>
-                  <a:schemeClr val="bg2">
-                    <a:lumMod val="50000"/>
-                  </a:schemeClr>
-                </a:solidFill>
-                <a:latin typeface="Consolas" panose="020B0609020204030204" pitchFamily="49" charset="0"/>
-              </a:rPr>
-              <a:t>devcontainer.json</a:t>
-            </a:r>
-            <a:r>
-              <a:rPr lang="en-US" dirty="0">
-                <a:solidFill>
-                  <a:schemeClr val="bg2">
-                    <a:lumMod val="50000"/>
-                  </a:schemeClr>
-                </a:solidFill>
-                <a:latin typeface="Consolas" panose="020B0609020204030204" pitchFamily="49" charset="0"/>
-              </a:rPr>
-              <a:t> </a:t>
-            </a:r>
-            <a:r>
-              <a:rPr lang="en-US" dirty="0"/>
-              <a:t>points to an image with code + debugger</a:t>
-            </a:r>
-          </a:p>
-          <a:p>
-            <a:pPr lvl="0"/>
-            <a:r>
-              <a:rPr lang="en-US" dirty="0"/>
-              <a:t>You are coding inside a running container!</a:t>
-            </a:r>
-          </a:p>
-          <a:p>
-            <a:pPr lvl="0"/>
-            <a:r>
-              <a:rPr lang="en-US" dirty="0"/>
-              <a:t>Current folder is mounted as a volume!</a:t>
-            </a:r>
-          </a:p>
-          <a:p>
-            <a:pPr lvl="0"/>
-            <a:endParaRPr dirty="0"/>
-          </a:p>
-        </p:txBody>
-      </p:sp>
-    </p:spTree>
-  </p:cSld>
-  <p:clrMapOvr>
-    <a:masterClrMapping/>
-  </p:clrMapOvr>
-</p:sld>
-</file>
-
 <file path=ppt/slides/slide31.xml><?xml version="1.0" encoding="utf-8"?>
 <p:sld xmlns:a="http://schemas.openxmlformats.org/drawingml/2006/main" xmlns:r="http://schemas.openxmlformats.org/officeDocument/2006/relationships" xmlns:p="http://schemas.openxmlformats.org/presentationml/2006/main">
   <p:cSld>
@@ -16419,6 +16314,198 @@
       </p:grpSpPr>
       <p:sp>
         <p:nvSpPr>
+          <p:cNvPr id="2" name="Title 1"/>
+          <p:cNvSpPr>
+            <a:spLocks noGrp="1"/>
+          </p:cNvSpPr>
+          <p:nvPr>
+            <p:ph type="title"/>
+          </p:nvPr>
+        </p:nvSpPr>
+        <p:spPr/>
+        <p:txBody>
+          <a:bodyPr/>
+          <a:lstStyle/>
+          <a:p>
+            <a:pPr marL="0" lvl="0" indent="0">
+              <a:buNone/>
+            </a:pPr>
+            <a:r>
+              <a:rPr dirty="0"/>
+              <a:t>Useful, </a:t>
+            </a:r>
+            <a:r>
+              <a:rPr lang="en-US" dirty="0"/>
+              <a:t>but </a:t>
+            </a:r>
+            <a:r>
+              <a:rPr dirty="0"/>
+              <a:t>not Realistic</a:t>
+            </a:r>
+            <a:r>
+              <a:rPr lang="en-US" dirty="0"/>
+              <a:t>: Enter Dev Containers</a:t>
+            </a:r>
+            <a:endParaRPr dirty="0"/>
+          </a:p>
+        </p:txBody>
+      </p:sp>
+      <p:sp>
+        <p:nvSpPr>
+          <p:cNvPr id="3" name="Content Placeholder 2"/>
+          <p:cNvSpPr>
+            <a:spLocks noGrp="1"/>
+          </p:cNvSpPr>
+          <p:nvPr>
+            <p:ph idx="1"/>
+          </p:nvPr>
+        </p:nvSpPr>
+        <p:spPr>
+          <a:xfrm>
+            <a:off x="628650" y="1268018"/>
+            <a:ext cx="7886700" cy="3365609"/>
+          </a:xfrm>
+        </p:spPr>
+        <p:txBody>
+          <a:bodyPr/>
+          <a:lstStyle/>
+          <a:p>
+            <a:pPr lvl="0"/>
+            <a:r>
+              <a:rPr dirty="0"/>
+              <a:t>This is a useful way to run your</a:t>
+            </a:r>
+            <a:r>
+              <a:rPr lang="en-US" dirty="0"/>
+              <a:t> working</a:t>
+            </a:r>
+            <a:r>
+              <a:rPr dirty="0"/>
+              <a:t> programs</a:t>
+            </a:r>
+          </a:p>
+          <a:p>
+            <a:pPr lvl="0"/>
+            <a:r>
+              <a:rPr lang="en-US" dirty="0"/>
+              <a:t>It is impracticable to implement a dev-loop this way:</a:t>
+            </a:r>
+            <a:br>
+              <a:rPr lang="en-US" dirty="0"/>
+            </a:br>
+            <a:r>
+              <a:rPr dirty="0"/>
+              <a:t>write</a:t>
+            </a:r>
+            <a:r>
+              <a:rPr lang="en-US" dirty="0">
+                <a:sym typeface="Wingdings" panose="05000000000000000000" pitchFamily="2" charset="2"/>
+              </a:rPr>
+              <a:t> </a:t>
+            </a:r>
+            <a:r>
+              <a:rPr dirty="0"/>
+              <a:t>run</a:t>
+            </a:r>
+            <a:r>
+              <a:rPr lang="en-US" dirty="0">
+                <a:sym typeface="Wingdings" panose="05000000000000000000" pitchFamily="2" charset="2"/>
+              </a:rPr>
+              <a:t> </a:t>
+            </a:r>
+            <a:r>
+              <a:rPr dirty="0"/>
+              <a:t>debu</a:t>
+            </a:r>
+            <a:r>
+              <a:rPr lang="en-US" dirty="0"/>
+              <a:t>g…</a:t>
+            </a:r>
+            <a:endParaRPr dirty="0"/>
+          </a:p>
+          <a:p>
+            <a:pPr lvl="0"/>
+            <a:r>
+              <a:rPr dirty="0"/>
+              <a:t>Enter the Visual Studio Code dev containers!</a:t>
+            </a:r>
+            <a:endParaRPr lang="en-US" dirty="0"/>
+          </a:p>
+          <a:p>
+            <a:r>
+              <a:rPr lang="en-US" dirty="0" err="1">
+                <a:solidFill>
+                  <a:schemeClr val="bg2">
+                    <a:lumMod val="50000"/>
+                  </a:schemeClr>
+                </a:solidFill>
+                <a:latin typeface="Consolas" panose="020B0609020204030204" pitchFamily="49" charset="0"/>
+              </a:rPr>
+              <a:t>devcontainer.json</a:t>
+            </a:r>
+            <a:r>
+              <a:rPr lang="en-US" dirty="0">
+                <a:solidFill>
+                  <a:schemeClr val="bg2">
+                    <a:lumMod val="50000"/>
+                  </a:schemeClr>
+                </a:solidFill>
+                <a:latin typeface="Consolas" panose="020B0609020204030204" pitchFamily="49" charset="0"/>
+              </a:rPr>
+              <a:t> </a:t>
+            </a:r>
+            <a:r>
+              <a:rPr lang="en-US" dirty="0"/>
+              <a:t>points to an image with code + debugger</a:t>
+            </a:r>
+          </a:p>
+          <a:p>
+            <a:pPr lvl="0"/>
+            <a:r>
+              <a:rPr lang="en-US" dirty="0"/>
+              <a:t>You are coding inside a running container!</a:t>
+            </a:r>
+          </a:p>
+          <a:p>
+            <a:pPr lvl="0"/>
+            <a:r>
+              <a:rPr lang="en-US" dirty="0"/>
+              <a:t>Current folder is mounted as a volume!</a:t>
+            </a:r>
+          </a:p>
+          <a:p>
+            <a:pPr lvl="0"/>
+            <a:endParaRPr dirty="0"/>
+          </a:p>
+        </p:txBody>
+      </p:sp>
+    </p:spTree>
+  </p:cSld>
+  <p:clrMapOvr>
+    <a:masterClrMapping/>
+  </p:clrMapOvr>
+</p:sld>
+</file>
+
+<file path=ppt/slides/slide32.xml><?xml version="1.0" encoding="utf-8"?>
+<p:sld xmlns:a="http://schemas.openxmlformats.org/drawingml/2006/main" xmlns:r="http://schemas.openxmlformats.org/officeDocument/2006/relationships" xmlns:p="http://schemas.openxmlformats.org/presentationml/2006/main">
+  <p:cSld>
+    <p:spTree>
+      <p:nvGrpSpPr>
+        <p:cNvPr id="1" name=""/>
+        <p:cNvGrpSpPr/>
+        <p:nvPr/>
+      </p:nvGrpSpPr>
+      <p:grpSpPr>
+        <a:xfrm>
+          <a:off x="0" y="0"/>
+          <a:ext cx="0" cy="0"/>
+          <a:chOff x="0" y="0"/>
+          <a:chExt cx="0" cy="0"/>
+        </a:xfrm>
+      </p:grpSpPr>
+      <p:sp>
+        <p:nvSpPr>
           <p:cNvPr id="5" name="Content Placeholder 4">
             <a:extLst>
               <a:ext uri="{FF2B5EF4-FFF2-40B4-BE49-F238E27FC236}">
@@ -16542,7 +16629,7 @@
 </p:sld>
 </file>
 
-<file path=ppt/slides/slide32.xml><?xml version="1.0" encoding="utf-8"?>
+<file path=ppt/slides/slide33.xml><?xml version="1.0" encoding="utf-8"?>
 <p:sld xmlns:a="http://schemas.openxmlformats.org/drawingml/2006/main" xmlns:r="http://schemas.openxmlformats.org/officeDocument/2006/relationships" xmlns:p="http://schemas.openxmlformats.org/presentationml/2006/main">
   <p:cSld>
     <p:spTree>
@@ -17022,7 +17109,7 @@
 </p:sld>
 </file>
 
-<file path=ppt/slides/slide33.xml><?xml version="1.0" encoding="utf-8"?>
+<file path=ppt/slides/slide34.xml><?xml version="1.0" encoding="utf-8"?>
 <p:sld xmlns:a="http://schemas.openxmlformats.org/drawingml/2006/main" xmlns:r="http://schemas.openxmlformats.org/officeDocument/2006/relationships" xmlns:p="http://schemas.openxmlformats.org/presentationml/2006/main">
   <p:cSld>
     <p:spTree>
@@ -17151,7 +17238,7 @@
 </p:sld>
 </file>
 
-<file path=ppt/slides/slide34.xml><?xml version="1.0" encoding="utf-8"?>
+<file path=ppt/slides/slide35.xml><?xml version="1.0" encoding="utf-8"?>
 <p:sld xmlns:a="http://schemas.openxmlformats.org/drawingml/2006/main" xmlns:r="http://schemas.openxmlformats.org/officeDocument/2006/relationships" xmlns:p="http://schemas.openxmlformats.org/presentationml/2006/main">
   <p:cSld>
     <p:spTree>
@@ -17317,7 +17404,7 @@
 </p:sld>
 </file>
 
-<file path=ppt/slides/slide35.xml><?xml version="1.0" encoding="utf-8"?>
+<file path=ppt/slides/slide36.xml><?xml version="1.0" encoding="utf-8"?>
 <p:sld xmlns:a="http://schemas.openxmlformats.org/drawingml/2006/main" xmlns:r="http://schemas.openxmlformats.org/officeDocument/2006/relationships" xmlns:p="http://schemas.openxmlformats.org/presentationml/2006/main">
   <p:cSld>
     <p:spTree>
@@ -18053,7 +18140,7 @@
 </p:sld>
 </file>
 
-<file path=ppt/slides/slide36.xml><?xml version="1.0" encoding="utf-8"?>
+<file path=ppt/slides/slide37.xml><?xml version="1.0" encoding="utf-8"?>
 <p:sld xmlns:a="http://schemas.openxmlformats.org/drawingml/2006/main" xmlns:r="http://schemas.openxmlformats.org/officeDocument/2006/relationships" xmlns:p="http://schemas.openxmlformats.org/presentationml/2006/main">
   <p:cSld>
     <p:spTree>
@@ -18227,7 +18314,7 @@
 </p:sld>
 </file>
 
-<file path=ppt/slides/slide37.xml><?xml version="1.0" encoding="utf-8"?>
+<file path=ppt/slides/slide38.xml><?xml version="1.0" encoding="utf-8"?>
 <p:sld xmlns:a="http://schemas.openxmlformats.org/drawingml/2006/main" xmlns:r="http://schemas.openxmlformats.org/officeDocument/2006/relationships" xmlns:p="http://schemas.openxmlformats.org/presentationml/2006/main">
   <p:cSld>
     <p:spTree>
@@ -18346,147 +18433,6 @@
 </p:sld>
 </file>
 
-<file path=ppt/slides/slide38.xml><?xml version="1.0" encoding="utf-8"?>
-<p:sld xmlns:a="http://schemas.openxmlformats.org/drawingml/2006/main" xmlns:r="http://schemas.openxmlformats.org/officeDocument/2006/relationships" xmlns:p="http://schemas.openxmlformats.org/presentationml/2006/main">
-  <p:cSld>
-    <p:spTree>
-      <p:nvGrpSpPr>
-        <p:cNvPr id="1" name=""/>
-        <p:cNvGrpSpPr/>
-        <p:nvPr/>
-      </p:nvGrpSpPr>
-      <p:grpSpPr>
-        <a:xfrm>
-          <a:off x="0" y="0"/>
-          <a:ext cx="0" cy="0"/>
-          <a:chOff x="0" y="0"/>
-          <a:chExt cx="0" cy="0"/>
-        </a:xfrm>
-      </p:grpSpPr>
-      <p:sp>
-        <p:nvSpPr>
-          <p:cNvPr id="2" name="Title 1"/>
-          <p:cNvSpPr>
-            <a:spLocks noGrp="1"/>
-          </p:cNvSpPr>
-          <p:nvPr>
-            <p:ph type="title"/>
-          </p:nvPr>
-        </p:nvSpPr>
-        <p:spPr/>
-        <p:txBody>
-          <a:bodyPr/>
-          <a:lstStyle/>
-          <a:p>
-            <a:pPr marL="0" lvl="0" indent="0">
-              <a:buNone/>
-            </a:pPr>
-            <a:r>
-              <a:t>Summary</a:t>
-            </a:r>
-          </a:p>
-        </p:txBody>
-      </p:sp>
-      <p:sp>
-        <p:nvSpPr>
-          <p:cNvPr id="3" name="Content Placeholder 2"/>
-          <p:cNvSpPr>
-            <a:spLocks noGrp="1"/>
-          </p:cNvSpPr>
-          <p:nvPr>
-            <p:ph idx="1"/>
-          </p:nvPr>
-        </p:nvSpPr>
-        <p:spPr/>
-        <p:txBody>
-          <a:bodyPr/>
-          <a:lstStyle/>
-          <a:p>
-            <a:pPr lvl="0"/>
-            <a:r>
-              <a:rPr dirty="0"/>
-              <a:t>Containers virtualize our applications</a:t>
-            </a:r>
-            <a:r>
-              <a:rPr lang="en-US" dirty="0"/>
-              <a:t>, </a:t>
-            </a:r>
-          </a:p>
-          <a:p>
-            <a:pPr lvl="1"/>
-            <a:r>
-              <a:rPr lang="en-US" dirty="0"/>
-              <a:t>b</a:t>
-            </a:r>
-            <a:r>
-              <a:rPr dirty="0"/>
-              <a:t>undling the dependencies with the app.</a:t>
-            </a:r>
-          </a:p>
-          <a:p>
-            <a:pPr lvl="0"/>
-            <a:r>
-              <a:rPr dirty="0"/>
-              <a:t>Find images for your containers on </a:t>
-            </a:r>
-            <a:r>
-              <a:rPr lang="en-US" dirty="0"/>
-              <a:t>repositories</a:t>
-            </a:r>
-          </a:p>
-          <a:p>
-            <a:pPr lvl="1"/>
-            <a:r>
-              <a:rPr dirty="0"/>
-              <a:t>docker hub and quay.io</a:t>
-            </a:r>
-          </a:p>
-          <a:p>
-            <a:pPr lvl="0"/>
-            <a:r>
-              <a:rPr dirty="0"/>
-              <a:t>You can manage multiple containers with docker-compose</a:t>
-            </a:r>
-            <a:r>
-              <a:rPr lang="en-US" dirty="0"/>
-              <a:t> and separate the configuration from the commands</a:t>
-            </a:r>
-            <a:endParaRPr dirty="0"/>
-          </a:p>
-          <a:p>
-            <a:pPr lvl="0"/>
-            <a:r>
-              <a:rPr dirty="0"/>
-              <a:t>Write code inside containers with </a:t>
-            </a:r>
-            <a:r>
-              <a:rPr lang="en-US" dirty="0"/>
-              <a:t>VS Co</a:t>
-            </a:r>
-            <a:r>
-              <a:rPr dirty="0"/>
-              <a:t>de dev containers!</a:t>
-            </a:r>
-            <a:endParaRPr lang="en-US" dirty="0"/>
-          </a:p>
-          <a:p>
-            <a:pPr lvl="0"/>
-            <a:r>
-              <a:rPr lang="en-US" dirty="0"/>
-              <a:t>Dev containers support docker compose for complex setups!</a:t>
-            </a:r>
-            <a:endParaRPr dirty="0"/>
-          </a:p>
-        </p:txBody>
-      </p:sp>
-    </p:spTree>
-  </p:cSld>
-  <p:clrMapOvr>
-    <a:masterClrMapping/>
-  </p:clrMapOvr>
-</p:sld>
-</file>
-
 <file path=ppt/slides/slide39.xml><?xml version="1.0" encoding="utf-8"?>
 <p:sld xmlns:a="http://schemas.openxmlformats.org/drawingml/2006/main" xmlns:r="http://schemas.openxmlformats.org/officeDocument/2006/relationships" xmlns:p="http://schemas.openxmlformats.org/presentationml/2006/main">
   <p:cSld>
@@ -18523,14 +18469,8 @@
               <a:buNone/>
             </a:pPr>
             <a:r>
-              <a:rPr dirty="0"/>
-              <a:t>But Wait…</a:t>
-            </a:r>
-            <a:r>
-              <a:rPr lang="en-US" dirty="0"/>
-              <a:t> There's more!</a:t>
-            </a:r>
-            <a:endParaRPr dirty="0"/>
+              <a:t>Summary</a:t>
+            </a:r>
           </a:p>
         </p:txBody>
       </p:sp>
@@ -18552,100 +18492,77 @@
             <a:pPr lvl="0"/>
             <a:r>
               <a:rPr dirty="0"/>
-              <a:t>How about a containerized Spark cluster</a:t>
-            </a:r>
-            <a:r>
-              <a:rPr lang="en-US" dirty="0"/>
-              <a:t> With a Jupyter front-end and </a:t>
-            </a:r>
-            <a:r>
-              <a:rPr lang="en-US" dirty="0" err="1"/>
-              <a:t>Minio</a:t>
-            </a:r>
-            <a:r>
-              <a:rPr lang="en-US" dirty="0"/>
-              <a:t> storage?</a:t>
-            </a:r>
-            <a:br>
-              <a:rPr lang="en-US" dirty="0"/>
-            </a:br>
-            <a:r>
-              <a:rPr lang="en-US" dirty="0">
-                <a:hlinkClick r:id="rId2"/>
-              </a:rPr>
-              <a:t>https://github.com/mafudge/docker-spark-cluster</a:t>
-            </a:r>
-            <a:r>
-              <a:rPr lang="en-US" dirty="0"/>
-              <a:t> </a:t>
+              <a:t>Containers virtualize our applications</a:t>
+            </a:r>
+            <a:r>
+              <a:rPr lang="en-US" dirty="0"/>
+              <a:t>, </a:t>
+            </a:r>
+          </a:p>
+          <a:p>
+            <a:pPr lvl="1"/>
+            <a:r>
+              <a:rPr lang="en-US" dirty="0"/>
+              <a:t>b</a:t>
+            </a:r>
+            <a:r>
+              <a:rPr dirty="0"/>
+              <a:t>undling the dependencies with the app.</a:t>
             </a:r>
           </a:p>
           <a:p>
             <a:pPr lvl="0"/>
             <a:r>
               <a:rPr dirty="0"/>
-              <a:t>Query your CSV/Excel files with SQL</a:t>
-            </a:r>
-            <a:r>
-              <a:rPr lang="en-US" dirty="0"/>
-              <a:t>. Drop  and go!</a:t>
-            </a:r>
-            <a:br>
-              <a:rPr lang="en-US" dirty="0"/>
-            </a:br>
-            <a:r>
-              <a:rPr lang="en-US" dirty="0">
-                <a:hlinkClick r:id="rId3"/>
-              </a:rPr>
-              <a:t>https://github.com/mafudge/local-file-drill</a:t>
-            </a:r>
-            <a:r>
-              <a:rPr lang="en-US" dirty="0"/>
-              <a:t>  </a:t>
+              <a:t>Find images for your containers on </a:t>
+            </a:r>
+            <a:r>
+              <a:rPr lang="en-US" dirty="0"/>
+              <a:t>repositories</a:t>
+            </a:r>
+          </a:p>
+          <a:p>
+            <a:pPr lvl="1"/>
+            <a:r>
+              <a:rPr dirty="0"/>
+              <a:t>docker hub and quay.io</a:t>
             </a:r>
           </a:p>
           <a:p>
             <a:pPr lvl="0"/>
             <a:r>
               <a:rPr dirty="0"/>
-              <a:t>Chat with your PDF file, 100% on device</a:t>
-            </a:r>
-            <a:r>
-              <a:rPr lang="en-US" dirty="0"/>
-              <a:t> using llama2 (</a:t>
-            </a:r>
+              <a:t>You can manage multiple containers with docker-compose</a:t>
+            </a:r>
+            <a:r>
+              <a:rPr lang="en-US" dirty="0"/>
+              <a:t> and separate the configuration from the commands</a:t>
+            </a:r>
+            <a:endParaRPr dirty="0"/>
+          </a:p>
+          <a:p>
+            <a:pPr lvl="0"/>
             <a:r>
               <a:rPr dirty="0"/>
-              <a:t>dev container</a:t>
-            </a:r>
-            <a:r>
-              <a:rPr lang="en-US" dirty="0"/>
-              <a:t> example) </a:t>
-            </a:r>
-            <a:br>
-              <a:rPr lang="en-US" dirty="0"/>
-            </a:br>
-            <a:r>
-              <a:rPr lang="en-US" dirty="0">
-                <a:hlinkClick r:id="rId4"/>
-              </a:rPr>
-              <a:t>https://github.com/mafudge/chat-pdf</a:t>
-            </a:r>
-            <a:r>
-              <a:rPr lang="en-US" dirty="0"/>
-              <a:t>   </a:t>
-            </a:r>
-          </a:p>
-          <a:p>
-            <a:pPr marL="0" lvl="0" indent="0">
-              <a:buNone/>
-            </a:pPr>
-            <a:br>
-              <a:rPr lang="en-US" dirty="0"/>
-            </a:br>
-            <a:endParaRPr dirty="0">
-              <a:latin typeface="Courier"/>
-            </a:endParaRPr>
+              <a:t>Write code inside containers with </a:t>
+            </a:r>
+            <a:r>
+              <a:rPr lang="en-US" dirty="0"/>
+              <a:t>VS Co</a:t>
+            </a:r>
+            <a:r>
+              <a:rPr dirty="0"/>
+              <a:t>de dev containers!</a:t>
+            </a:r>
+            <a:endParaRPr lang="en-US" dirty="0"/>
+          </a:p>
+          <a:p>
+            <a:pPr lvl="0"/>
+            <a:r>
+              <a:rPr lang="en-US" dirty="0"/>
+              <a:t>Dev containers support docker compose for complex setups!</a:t>
+            </a:r>
+            <a:endParaRPr dirty="0"/>
           </a:p>
         </p:txBody>
       </p:sp>
@@ -18693,7 +18610,7 @@
               <a:buNone/>
             </a:pPr>
             <a:r>
-              <a:t>What is a container?</a:t>
+              <a:t>Rationale</a:t>
             </a:r>
           </a:p>
         </p:txBody>
@@ -18713,24 +18630,51 @@
           <a:bodyPr/>
           <a:lstStyle/>
           <a:p>
+            <a:pPr marL="0" lvl="0" indent="0">
+              <a:buNone/>
+            </a:pPr>
+            <a:r>
+              <a:rPr dirty="0"/>
+              <a:t>Have you ever:</a:t>
+            </a:r>
+          </a:p>
+          <a:p>
             <a:pPr lvl="0"/>
             <a:r>
               <a:rPr dirty="0"/>
-              <a:t>A container is a form of virtualization.</a:t>
+              <a:t>Worked on a project on more than one computer?</a:t>
             </a:r>
           </a:p>
           <a:p>
             <a:pPr lvl="0"/>
             <a:r>
               <a:rPr dirty="0"/>
-              <a:t>Containers virtualize the application and its dependencies.</a:t>
+              <a:t>Shared a project with a team?</a:t>
             </a:r>
           </a:p>
           <a:p>
             <a:pPr lvl="0"/>
             <a:r>
+              <a:rPr lang="en-US" dirty="0"/>
+              <a:t>Said this</a:t>
+            </a:r>
+            <a:r>
               <a:rPr dirty="0"/>
-              <a:t>The virtualization occurs closer to the application than the hardware.</a:t>
+              <a:t>: “but it works on my machine…”</a:t>
+            </a:r>
+          </a:p>
+          <a:p>
+            <a:pPr lvl="0"/>
+            <a:r>
+              <a:rPr dirty="0"/>
+              <a:t>Spent hours trying to deploy your project live?</a:t>
+            </a:r>
+          </a:p>
+          <a:p>
+            <a:pPr lvl="0"/>
+            <a:r>
+              <a:rPr dirty="0"/>
+              <a:t>If so, then containers are for YOU!</a:t>
             </a:r>
           </a:p>
         </p:txBody>
@@ -18779,8 +18723,14 @@
               <a:buNone/>
             </a:pPr>
             <a:r>
-              <a:t>Cleaning up</a:t>
-            </a:r>
+              <a:rPr dirty="0"/>
+              <a:t>But Wait…</a:t>
+            </a:r>
+            <a:r>
+              <a:rPr lang="en-US" dirty="0"/>
+              <a:t> There's more!</a:t>
+            </a:r>
+            <a:endParaRPr dirty="0"/>
           </a:p>
         </p:txBody>
       </p:sp>
@@ -18801,17 +18751,101 @@
           <a:p>
             <a:pPr lvl="0"/>
             <a:r>
-              <a:t>You might want to reclaim some disk space after the talk</a:t>
+              <a:rPr dirty="0"/>
+              <a:t>How about a containerized Spark cluster</a:t>
+            </a:r>
+            <a:r>
+              <a:rPr lang="en-US" dirty="0"/>
+              <a:t> With a Jupyter front-end and </a:t>
+            </a:r>
+            <a:r>
+              <a:rPr lang="en-US" dirty="0" err="1"/>
+              <a:t>Minio</a:t>
+            </a:r>
+            <a:r>
+              <a:rPr lang="en-US" dirty="0"/>
+              <a:t> storage?</a:t>
+            </a:r>
+            <a:br>
+              <a:rPr lang="en-US" dirty="0"/>
+            </a:br>
+            <a:r>
+              <a:rPr lang="en-US" dirty="0">
+                <a:hlinkClick r:id="rId2"/>
+              </a:rPr>
+              <a:t>https://github.com/mafudge/docker-spark-cluster</a:t>
+            </a:r>
+            <a:r>
+              <a:rPr lang="en-US" dirty="0"/>
+              <a:t> </a:t>
             </a:r>
           </a:p>
           <a:p>
             <a:pPr lvl="0"/>
             <a:r>
-              <a:rPr>
-                <a:latin typeface="Courier"/>
+              <a:rPr dirty="0"/>
+              <a:t>Query your CSV/Excel files with SQL</a:t>
+            </a:r>
+            <a:r>
+              <a:rPr lang="en-US" dirty="0"/>
+              <a:t>. Drop  and go!</a:t>
+            </a:r>
+            <a:br>
+              <a:rPr lang="en-US" dirty="0"/>
+            </a:br>
+            <a:r>
+              <a:rPr lang="en-US" dirty="0">
+                <a:hlinkClick r:id="rId3"/>
               </a:rPr>
-              <a:t>docker system prune --all --volumes</a:t>
-            </a:r>
+              <a:t>https://github.com/mafudge/local-file-drill</a:t>
+            </a:r>
+            <a:r>
+              <a:rPr lang="en-US" dirty="0"/>
+              <a:t>  </a:t>
+            </a:r>
+          </a:p>
+          <a:p>
+            <a:pPr lvl="0"/>
+            <a:r>
+              <a:rPr dirty="0"/>
+              <a:t>Chat with your PDF file, 100% on device</a:t>
+            </a:r>
+            <a:r>
+              <a:rPr lang="en-US" dirty="0"/>
+              <a:t> using llama2 (</a:t>
+            </a:r>
+            <a:r>
+              <a:rPr dirty="0"/>
+              <a:t>dev container</a:t>
+            </a:r>
+            <a:r>
+              <a:rPr lang="en-US" dirty="0"/>
+              <a:t> example) </a:t>
+            </a:r>
+            <a:br>
+              <a:rPr lang="en-US" dirty="0"/>
+            </a:br>
+            <a:r>
+              <a:rPr lang="en-US" dirty="0">
+                <a:hlinkClick r:id="rId4"/>
+              </a:rPr>
+              <a:t>https://github.com/mafudge/chat-pdf</a:t>
+            </a:r>
+            <a:r>
+              <a:rPr lang="en-US" dirty="0"/>
+              <a:t>   </a:t>
+            </a:r>
+          </a:p>
+          <a:p>
+            <a:pPr marL="0" lvl="0" indent="0">
+              <a:buNone/>
+            </a:pPr>
+            <a:br>
+              <a:rPr lang="en-US" dirty="0"/>
+            </a:br>
+            <a:endParaRPr dirty="0">
+              <a:latin typeface="Courier"/>
+            </a:endParaRPr>
           </a:p>
         </p:txBody>
       </p:sp>
@@ -18824,6 +18858,86 @@
 </file>
 
 <file path=ppt/slides/slide41.xml><?xml version="1.0" encoding="utf-8"?>
+<p:sld xmlns:a="http://schemas.openxmlformats.org/drawingml/2006/main" xmlns:r="http://schemas.openxmlformats.org/officeDocument/2006/relationships" xmlns:p="http://schemas.openxmlformats.org/presentationml/2006/main">
+  <p:cSld>
+    <p:spTree>
+      <p:nvGrpSpPr>
+        <p:cNvPr id="1" name=""/>
+        <p:cNvGrpSpPr/>
+        <p:nvPr/>
+      </p:nvGrpSpPr>
+      <p:grpSpPr>
+        <a:xfrm>
+          <a:off x="0" y="0"/>
+          <a:ext cx="0" cy="0"/>
+          <a:chOff x="0" y="0"/>
+          <a:chExt cx="0" cy="0"/>
+        </a:xfrm>
+      </p:grpSpPr>
+      <p:sp>
+        <p:nvSpPr>
+          <p:cNvPr id="2" name="Title 1"/>
+          <p:cNvSpPr>
+            <a:spLocks noGrp="1"/>
+          </p:cNvSpPr>
+          <p:nvPr>
+            <p:ph type="title"/>
+          </p:nvPr>
+        </p:nvSpPr>
+        <p:spPr/>
+        <p:txBody>
+          <a:bodyPr/>
+          <a:lstStyle/>
+          <a:p>
+            <a:pPr marL="0" lvl="0" indent="0">
+              <a:buNone/>
+            </a:pPr>
+            <a:r>
+              <a:t>Cleaning up</a:t>
+            </a:r>
+          </a:p>
+        </p:txBody>
+      </p:sp>
+      <p:sp>
+        <p:nvSpPr>
+          <p:cNvPr id="3" name="Content Placeholder 2"/>
+          <p:cNvSpPr>
+            <a:spLocks noGrp="1"/>
+          </p:cNvSpPr>
+          <p:nvPr>
+            <p:ph idx="1"/>
+          </p:nvPr>
+        </p:nvSpPr>
+        <p:spPr/>
+        <p:txBody>
+          <a:bodyPr/>
+          <a:lstStyle/>
+          <a:p>
+            <a:pPr lvl="0"/>
+            <a:r>
+              <a:t>You might want to reclaim some disk space after the talk</a:t>
+            </a:r>
+          </a:p>
+          <a:p>
+            <a:pPr lvl="0"/>
+            <a:r>
+              <a:rPr>
+                <a:latin typeface="Courier"/>
+              </a:rPr>
+              <a:t>docker system prune --all --volumes</a:t>
+            </a:r>
+          </a:p>
+        </p:txBody>
+      </p:sp>
+    </p:spTree>
+  </p:cSld>
+  <p:clrMapOvr>
+    <a:masterClrMapping/>
+  </p:clrMapOvr>
+</p:sld>
+</file>
+
+<file path=ppt/slides/slide42.xml><?xml version="1.0" encoding="utf-8"?>
 <p:sld xmlns:a="http://schemas.openxmlformats.org/drawingml/2006/main" xmlns:r="http://schemas.openxmlformats.org/officeDocument/2006/relationships" xmlns:p="http://schemas.openxmlformats.org/presentationml/2006/main">
   <p:cSld>
     <p:spTree>
@@ -19060,6 +19174,92 @@
 </file>
 
 <file path=ppt/slides/slide5.xml><?xml version="1.0" encoding="utf-8"?>
+<p:sld xmlns:a="http://schemas.openxmlformats.org/drawingml/2006/main" xmlns:r="http://schemas.openxmlformats.org/officeDocument/2006/relationships" xmlns:p="http://schemas.openxmlformats.org/presentationml/2006/main">
+  <p:cSld>
+    <p:spTree>
+      <p:nvGrpSpPr>
+        <p:cNvPr id="1" name=""/>
+        <p:cNvGrpSpPr/>
+        <p:nvPr/>
+      </p:nvGrpSpPr>
+      <p:grpSpPr>
+        <a:xfrm>
+          <a:off x="0" y="0"/>
+          <a:ext cx="0" cy="0"/>
+          <a:chOff x="0" y="0"/>
+          <a:chExt cx="0" cy="0"/>
+        </a:xfrm>
+      </p:grpSpPr>
+      <p:sp>
+        <p:nvSpPr>
+          <p:cNvPr id="2" name="Title 1"/>
+          <p:cNvSpPr>
+            <a:spLocks noGrp="1"/>
+          </p:cNvSpPr>
+          <p:nvPr>
+            <p:ph type="title"/>
+          </p:nvPr>
+        </p:nvSpPr>
+        <p:spPr/>
+        <p:txBody>
+          <a:bodyPr/>
+          <a:lstStyle/>
+          <a:p>
+            <a:pPr marL="0" lvl="0" indent="0">
+              <a:buNone/>
+            </a:pPr>
+            <a:r>
+              <a:t>What is a container?</a:t>
+            </a:r>
+          </a:p>
+        </p:txBody>
+      </p:sp>
+      <p:sp>
+        <p:nvSpPr>
+          <p:cNvPr id="3" name="Content Placeholder 2"/>
+          <p:cNvSpPr>
+            <a:spLocks noGrp="1"/>
+          </p:cNvSpPr>
+          <p:nvPr>
+            <p:ph idx="1"/>
+          </p:nvPr>
+        </p:nvSpPr>
+        <p:spPr/>
+        <p:txBody>
+          <a:bodyPr/>
+          <a:lstStyle/>
+          <a:p>
+            <a:pPr lvl="0"/>
+            <a:r>
+              <a:rPr dirty="0"/>
+              <a:t>A container is a form of virtualization.</a:t>
+            </a:r>
+          </a:p>
+          <a:p>
+            <a:pPr lvl="0"/>
+            <a:r>
+              <a:rPr dirty="0"/>
+              <a:t>Containers virtualize the application and its dependencies.</a:t>
+            </a:r>
+          </a:p>
+          <a:p>
+            <a:pPr lvl="0"/>
+            <a:r>
+              <a:rPr dirty="0"/>
+              <a:t>The virtualization occurs closer to the application than the hardware.</a:t>
+            </a:r>
+          </a:p>
+        </p:txBody>
+      </p:sp>
+    </p:spTree>
+  </p:cSld>
+  <p:clrMapOvr>
+    <a:masterClrMapping/>
+  </p:clrMapOvr>
+</p:sld>
+</file>
+
+<file path=ppt/slides/slide6.xml><?xml version="1.0" encoding="utf-8"?>
 <p:sld xmlns:a="http://schemas.openxmlformats.org/drawingml/2006/main" xmlns:r="http://schemas.openxmlformats.org/officeDocument/2006/relationships" xmlns:p="http://schemas.openxmlformats.org/presentationml/2006/main">
   <p:cSld>
     <p:spTree>
@@ -19151,107 +19351,6 @@
 </p:sld>
 </file>
 
-<file path=ppt/slides/slide6.xml><?xml version="1.0" encoding="utf-8"?>
-<p:sld xmlns:a="http://schemas.openxmlformats.org/drawingml/2006/main" xmlns:r="http://schemas.openxmlformats.org/officeDocument/2006/relationships" xmlns:p="http://schemas.openxmlformats.org/presentationml/2006/main">
-  <p:cSld>
-    <p:spTree>
-      <p:nvGrpSpPr>
-        <p:cNvPr id="1" name=""/>
-        <p:cNvGrpSpPr/>
-        <p:nvPr/>
-      </p:nvGrpSpPr>
-      <p:grpSpPr>
-        <a:xfrm>
-          <a:off x="0" y="0"/>
-          <a:ext cx="0" cy="0"/>
-          <a:chOff x="0" y="0"/>
-          <a:chExt cx="0" cy="0"/>
-        </a:xfrm>
-      </p:grpSpPr>
-      <p:sp>
-        <p:nvSpPr>
-          <p:cNvPr id="2" name="Title 1"/>
-          <p:cNvSpPr>
-            <a:spLocks noGrp="1"/>
-          </p:cNvSpPr>
-          <p:nvPr>
-            <p:ph type="title"/>
-          </p:nvPr>
-        </p:nvSpPr>
-        <p:spPr/>
-        <p:txBody>
-          <a:bodyPr/>
-          <a:lstStyle/>
-          <a:p>
-            <a:pPr marL="0" lvl="0" indent="0">
-              <a:buNone/>
-            </a:pPr>
-            <a:r>
-              <a:t>Benefits of Containers</a:t>
-            </a:r>
-          </a:p>
-        </p:txBody>
-      </p:sp>
-      <p:sp>
-        <p:nvSpPr>
-          <p:cNvPr id="3" name="Content Placeholder 2"/>
-          <p:cNvSpPr>
-            <a:spLocks noGrp="1"/>
-          </p:cNvSpPr>
-          <p:nvPr>
-            <p:ph idx="1"/>
-          </p:nvPr>
-        </p:nvSpPr>
-        <p:spPr/>
-        <p:txBody>
-          <a:bodyPr/>
-          <a:lstStyle/>
-          <a:p>
-            <a:pPr lvl="0"/>
-            <a:r>
-              <a:rPr b="1" dirty="0"/>
-              <a:t>Reproducibility</a:t>
-            </a:r>
-            <a:r>
-              <a:rPr lang="en-US" b="1" dirty="0"/>
-              <a:t> of work</a:t>
-            </a:r>
-            <a:r>
-              <a:rPr dirty="0"/>
-              <a:t> - drastically minimizes “but it works on my machine”.</a:t>
-            </a:r>
-          </a:p>
-          <a:p>
-            <a:pPr lvl="0"/>
-            <a:r>
-              <a:rPr dirty="0"/>
-              <a:t>Bundle the dependencies with your application.</a:t>
-            </a:r>
-          </a:p>
-          <a:p>
-            <a:pPr lvl="0"/>
-            <a:r>
-              <a:rPr dirty="0"/>
-              <a:t>Can mimic complex environments with external systems.</a:t>
-            </a:r>
-          </a:p>
-          <a:p>
-            <a:pPr lvl="0"/>
-            <a:r>
-              <a:rPr dirty="0"/>
-              <a:t>When combined with a git workflow, it can be team and cloud friendly.</a:t>
-            </a:r>
-          </a:p>
-        </p:txBody>
-      </p:sp>
-    </p:spTree>
-  </p:cSld>
-  <p:clrMapOvr>
-    <a:masterClrMapping/>
-  </p:clrMapOvr>
-</p:sld>
-</file>
-
 <file path=ppt/slides/slide7.xml><?xml version="1.0" encoding="utf-8"?>
 <p:sld xmlns:a="http://schemas.openxmlformats.org/drawingml/2006/main" xmlns:r="http://schemas.openxmlformats.org/officeDocument/2006/relationships" xmlns:p="http://schemas.openxmlformats.org/presentationml/2006/main">
   <p:cSld>
@@ -19288,14 +19387,8 @@
               <a:buNone/>
             </a:pPr>
             <a:r>
-              <a:rPr dirty="0"/>
-              <a:t>Container </a:t>
-            </a:r>
-            <a:r>
-              <a:rPr lang="en-US" dirty="0"/>
-              <a:t>Terminology</a:t>
-            </a:r>
-            <a:endParaRPr dirty="0"/>
+              <a:t>Benefits of Containers</a:t>
+            </a:r>
           </a:p>
         </p:txBody>
       </p:sp>
@@ -19317,63 +19410,36 @@
             <a:pPr lvl="0"/>
             <a:r>
               <a:rPr b="1" dirty="0"/>
-              <a:t>Image</a:t>
+              <a:t>Reproducibility</a:t>
+            </a:r>
+            <a:r>
+              <a:rPr lang="en-US" b="1" dirty="0"/>
+              <a:t> of work</a:t>
             </a:r>
             <a:r>
               <a:rPr dirty="0"/>
-              <a:t> application + dependencies at rest, consumes disk</a:t>
+              <a:t> - drastically minimizes “but it works on my machine”.</a:t>
             </a:r>
           </a:p>
           <a:p>
             <a:pPr lvl="0"/>
             <a:r>
-              <a:rPr b="1" dirty="0"/>
-              <a:t>Tag</a:t>
-            </a:r>
-            <a:r>
               <a:rPr dirty="0"/>
-              <a:t> the version / release name of the image</a:t>
+              <a:t>Bundle the dependencies with your application.</a:t>
             </a:r>
           </a:p>
           <a:p>
             <a:pPr lvl="0"/>
             <a:r>
-              <a:rPr b="1" dirty="0"/>
-              <a:t>Container</a:t>
-            </a:r>
-            <a:r>
               <a:rPr dirty="0"/>
-              <a:t> running image</a:t>
-            </a:r>
-            <a:r>
-              <a:rPr lang="en-US" dirty="0"/>
-              <a:t>:</a:t>
-            </a:r>
+              <a:t>Can mimic complex environments with external systems.</a:t>
+            </a:r>
+          </a:p>
+          <a:p>
+            <a:pPr lvl="0"/>
             <a:r>
               <a:rPr dirty="0"/>
-              <a:t> consumes disk + RAM/CPU/Network</a:t>
-            </a:r>
-          </a:p>
-          <a:p>
-            <a:pPr lvl="0"/>
-            <a:r>
-              <a:rPr b="1" dirty="0"/>
-              <a:t>Port</a:t>
-            </a:r>
-            <a:r>
-              <a:rPr dirty="0"/>
-              <a:t> expose a TCP/UDP Port outside the container</a:t>
-            </a:r>
-          </a:p>
-          <a:p>
-            <a:pPr lvl="0"/>
-            <a:r>
-              <a:rPr b="1" dirty="0"/>
-              <a:t>Volume</a:t>
-            </a:r>
-            <a:r>
-              <a:rPr dirty="0"/>
-              <a:t> persistent storage for a container</a:t>
+              <a:t>When combined with a git workflow, it can be team and cloud friendly.</a:t>
             </a:r>
           </a:p>
         </p:txBody>
@@ -19405,6 +19471,36 @@
       </p:grpSpPr>
       <p:sp>
         <p:nvSpPr>
+          <p:cNvPr id="2" name="Title 1"/>
+          <p:cNvSpPr>
+            <a:spLocks noGrp="1"/>
+          </p:cNvSpPr>
+          <p:nvPr>
+            <p:ph type="title"/>
+          </p:nvPr>
+        </p:nvSpPr>
+        <p:spPr/>
+        <p:txBody>
+          <a:bodyPr/>
+          <a:lstStyle/>
+          <a:p>
+            <a:pPr marL="0" lvl="0" indent="0">
+              <a:buNone/>
+            </a:pPr>
+            <a:r>
+              <a:rPr dirty="0"/>
+              <a:t>Container </a:t>
+            </a:r>
+            <a:r>
+              <a:rPr lang="en-US" dirty="0"/>
+              <a:t>Terminology</a:t>
+            </a:r>
+            <a:endParaRPr dirty="0"/>
+          </a:p>
+        </p:txBody>
+      </p:sp>
+      <p:sp>
+        <p:nvSpPr>
           <p:cNvPr id="3" name="Content Placeholder 2"/>
           <p:cNvSpPr>
             <a:spLocks noGrp="1"/>
@@ -19420,77 +19516,64 @@
           <a:p>
             <a:pPr lvl="0"/>
             <a:r>
+              <a:rPr b="1" dirty="0"/>
+              <a:t>Image</a:t>
+            </a:r>
+            <a:r>
               <a:rPr dirty="0"/>
-              <a:t>It always starts with a need</a:t>
-            </a:r>
-            <a:r>
-              <a:rPr lang="en-US" dirty="0"/>
-              <a:t>…</a:t>
-            </a:r>
-            <a:endParaRPr dirty="0"/>
+              <a:t> application + dependencies at rest, consumes disk</a:t>
+            </a:r>
           </a:p>
           <a:p>
             <a:pPr lvl="0"/>
             <a:r>
+              <a:rPr b="1" dirty="0"/>
+              <a:t>Tag</a:t>
+            </a:r>
+            <a:r>
               <a:rPr dirty="0"/>
-              <a:t>Hmm. I’d like to use: </a:t>
-            </a:r>
-            <a:r>
-              <a:rPr dirty="0">
-                <a:hlinkClick r:id="rId3"/>
-              </a:rPr>
-              <a:t>https://jupyter.org/install</a:t>
-            </a:r>
-            <a:r>
-              <a:rPr lang="en-US" dirty="0"/>
-              <a:t> </a:t>
-            </a:r>
-            <a:endParaRPr dirty="0"/>
+              <a:t> the version / release name of the image</a:t>
+            </a:r>
           </a:p>
           <a:p>
             <a:pPr lvl="0"/>
             <a:r>
+              <a:rPr b="1" dirty="0"/>
+              <a:t>Container</a:t>
+            </a:r>
+            <a:r>
               <a:rPr dirty="0"/>
-              <a:t>Rather than install </a:t>
-            </a:r>
-            <a:r>
-              <a:rPr lang="en-US" dirty="0"/>
-              <a:t>all those dependencies </a:t>
+              <a:t> running image</a:t>
+            </a:r>
+            <a:r>
+              <a:rPr lang="en-US" dirty="0"/>
+              <a:t>:</a:t>
             </a:r>
             <a:r>
               <a:rPr dirty="0"/>
-              <a:t>on your computer, run it in a container!</a:t>
+              <a:t> consumes disk + RAM/CPU/Network</a:t>
             </a:r>
           </a:p>
           <a:p>
             <a:pPr lvl="0"/>
             <a:r>
+              <a:rPr b="1" dirty="0"/>
+              <a:t>Port</a:t>
+            </a:r>
+            <a:r>
               <a:rPr dirty="0"/>
-              <a:t>Portability! Reproducibility!</a:t>
-            </a:r>
-          </a:p>
-        </p:txBody>
-      </p:sp>
-      <p:sp>
-        <p:nvSpPr>
-          <p:cNvPr id="2" name="Title 1"/>
-          <p:cNvSpPr>
-            <a:spLocks noGrp="1"/>
-          </p:cNvSpPr>
-          <p:nvPr>
-            <p:ph type="title"/>
-          </p:nvPr>
-        </p:nvSpPr>
-        <p:spPr/>
-        <p:txBody>
-          <a:bodyPr/>
-          <a:lstStyle/>
-          <a:p>
-            <a:pPr marL="0" lvl="0" indent="0">
-              <a:buNone/>
-            </a:pPr>
-            <a:r>
-              <a:t>Our first container</a:t>
+              <a:t> expose a TCP/UDP Port outside the container</a:t>
+            </a:r>
+          </a:p>
+          <a:p>
+            <a:pPr lvl="0"/>
+            <a:r>
+              <a:rPr b="1" dirty="0"/>
+              <a:t>Volume</a:t>
+            </a:r>
+            <a:r>
+              <a:rPr dirty="0"/>
+              <a:t> persistent storage for a container</a:t>
             </a:r>
           </a:p>
         </p:txBody>
@@ -19522,6 +19605,74 @@
       </p:grpSpPr>
       <p:sp>
         <p:nvSpPr>
+          <p:cNvPr id="3" name="Content Placeholder 2"/>
+          <p:cNvSpPr>
+            <a:spLocks noGrp="1"/>
+          </p:cNvSpPr>
+          <p:nvPr>
+            <p:ph idx="1"/>
+          </p:nvPr>
+        </p:nvSpPr>
+        <p:spPr/>
+        <p:txBody>
+          <a:bodyPr/>
+          <a:lstStyle/>
+          <a:p>
+            <a:pPr lvl="0"/>
+            <a:r>
+              <a:rPr dirty="0"/>
+              <a:t>It always starts with a need</a:t>
+            </a:r>
+            <a:r>
+              <a:rPr lang="en-US" dirty="0"/>
+              <a:t>…</a:t>
+            </a:r>
+            <a:endParaRPr dirty="0"/>
+          </a:p>
+          <a:p>
+            <a:pPr lvl="0"/>
+            <a:r>
+              <a:rPr dirty="0"/>
+              <a:t>Hmm. I’d like to use: </a:t>
+            </a:r>
+            <a:r>
+              <a:rPr dirty="0">
+                <a:hlinkClick r:id="rId3"/>
+              </a:rPr>
+              <a:t>https://jupyter.org/install</a:t>
+            </a:r>
+            <a:r>
+              <a:rPr lang="en-US" dirty="0"/>
+              <a:t> </a:t>
+            </a:r>
+            <a:endParaRPr dirty="0"/>
+          </a:p>
+          <a:p>
+            <a:pPr lvl="0"/>
+            <a:r>
+              <a:rPr dirty="0"/>
+              <a:t>Rather than install </a:t>
+            </a:r>
+            <a:r>
+              <a:rPr lang="en-US" dirty="0"/>
+              <a:t>all those dependencies </a:t>
+            </a:r>
+            <a:r>
+              <a:rPr dirty="0"/>
+              <a:t>on your computer, run it in a container!</a:t>
+            </a:r>
+          </a:p>
+          <a:p>
+            <a:pPr lvl="0"/>
+            <a:r>
+              <a:rPr dirty="0"/>
+              <a:t>Portability! Reproducibility!</a:t>
+            </a:r>
+          </a:p>
+        </p:txBody>
+      </p:sp>
+      <p:sp>
+        <p:nvSpPr>
           <p:cNvPr id="2" name="Title 1"/>
           <p:cNvSpPr>
             <a:spLocks noGrp="1"/>
@@ -19539,97 +19690,8 @@
               <a:buNone/>
             </a:pPr>
             <a:r>
-              <a:rPr dirty="0" err="1"/>
-              <a:t>Dockerhub</a:t>
-            </a:r>
-            <a:r>
-              <a:rPr dirty="0"/>
-              <a:t>: finding image</a:t>
-            </a:r>
-            <a:r>
-              <a:rPr lang="en-US" dirty="0"/>
-              <a:t>s</a:t>
-            </a:r>
-            <a:endParaRPr dirty="0"/>
-          </a:p>
-        </p:txBody>
-      </p:sp>
-      <p:sp>
-        <p:nvSpPr>
-          <p:cNvPr id="3" name="Content Placeholder 2"/>
-          <p:cNvSpPr>
-            <a:spLocks noGrp="1"/>
-          </p:cNvSpPr>
-          <p:nvPr>
-            <p:ph idx="1"/>
-          </p:nvPr>
-        </p:nvSpPr>
-        <p:spPr/>
-        <p:txBody>
-          <a:bodyPr/>
-          <a:lstStyle/>
-          <a:p>
-            <a:pPr lvl="0"/>
-            <a:r>
-              <a:rPr dirty="0" err="1"/>
-              <a:t>Dockerhub</a:t>
-            </a:r>
-            <a:r>
-              <a:rPr dirty="0"/>
-              <a:t> is an example of a container registry. </a:t>
-            </a:r>
-            <a:r>
-              <a:rPr dirty="0">
-                <a:hlinkClick r:id="rId2"/>
-              </a:rPr>
-              <a:t>https://hub.docker.com</a:t>
-            </a:r>
-            <a:r>
-              <a:rPr lang="en-US" dirty="0"/>
-              <a:t> </a:t>
-            </a:r>
-            <a:endParaRPr dirty="0"/>
-          </a:p>
-          <a:p>
-            <a:pPr lvl="0"/>
-            <a:r>
-              <a:rPr dirty="0"/>
-              <a:t>A catalog of container images in the cloud!</a:t>
-            </a:r>
-          </a:p>
-          <a:p>
-            <a:pPr lvl="0"/>
-            <a:r>
-              <a:rPr dirty="0">
-                <a:hlinkClick r:id="rId3"/>
-              </a:rPr>
-              <a:t>https://hub.docker.com/search?q=jupyter%2Fminimal-notebook</a:t>
-            </a:r>
-            <a:r>
-              <a:rPr lang="en-US" dirty="0"/>
-              <a:t> </a:t>
-            </a:r>
-          </a:p>
-          <a:p>
-            <a:pPr lvl="0"/>
-            <a:r>
-              <a:rPr lang="en-US" dirty="0"/>
-              <a:t>Red Hat's Quay.io is another:</a:t>
-            </a:r>
-            <a:br>
-              <a:rPr lang="en-US" dirty="0"/>
-            </a:br>
-            <a:r>
-              <a:rPr dirty="0">
-                <a:hlinkClick r:id="rId4"/>
-              </a:rPr>
-              <a:t>https://quay.io/repository/jupyter/minimal-notebook</a:t>
-            </a:r>
-            <a:r>
-              <a:rPr lang="en-US" dirty="0"/>
-              <a:t> </a:t>
-            </a:r>
-            <a:endParaRPr dirty="0"/>
+              <a:t>Our first container</a:t>
+            </a:r>
           </a:p>
         </p:txBody>
       </p:sp>

</xml_diff>